<commit_message>
Kurumsal yazilim mimarileri sunumu duzeltmeler yapildi
</commit_message>
<xml_diff>
--- a/presentations/EnterpriseSoftwareArchitectures.pptx
+++ b/presentations/EnterpriseSoftwareArchitectures.pptx
@@ -6059,6 +6059,114 @@
           </a:prstGeom>
         </p:spPr>
       </p:pic>
+      <p:sp>
+        <p:nvSpPr>
+          <p:cNvPr id="3" name="Title 1">
+            <a:extLst>
+              <a:ext uri="{FF2B5EF4-FFF2-40B4-BE49-F238E27FC236}">
+                <a16:creationId xmlns:a16="http://schemas.microsoft.com/office/drawing/2014/main" id="{1CCD8CCD-6EB7-4B9B-95AF-27CB36524A25}"/>
+              </a:ext>
+            </a:extLst>
+          </p:cNvPr>
+          <p:cNvSpPr txBox="1">
+            <a:spLocks/>
+          </p:cNvSpPr>
+          <p:nvPr/>
+        </p:nvSpPr>
+        <p:spPr>
+          <a:xfrm>
+            <a:off x="364034" y="6378601"/>
+            <a:ext cx="2404333" cy="584261"/>
+          </a:xfrm>
+          <a:prstGeom prst="rect">
+            <a:avLst/>
+          </a:prstGeom>
+        </p:spPr>
+        <p:txBody>
+          <a:bodyPr vert="horz" lIns="91440" tIns="45720" rIns="91440" bIns="45720" rtlCol="0" anchor="t">
+            <a:normAutofit fontScale="70000" lnSpcReduction="20000"/>
+          </a:bodyPr>
+          <a:lstStyle>
+            <a:lvl1pPr algn="l" defTabSz="457200" rtl="0" eaLnBrk="1" latinLnBrk="0" hangingPunct="1">
+              <a:spcBef>
+                <a:spcPct val="0"/>
+              </a:spcBef>
+              <a:buNone/>
+              <a:defRPr sz="3600" kern="1200">
+                <a:solidFill>
+                  <a:schemeClr val="accent1"/>
+                </a:solidFill>
+                <a:latin typeface="+mj-lt"/>
+                <a:ea typeface="+mj-ea"/>
+                <a:cs typeface="+mj-cs"/>
+              </a:defRPr>
+            </a:lvl1pPr>
+            <a:lvl2pPr eaLnBrk="1" hangingPunct="1">
+              <a:defRPr>
+                <a:solidFill>
+                  <a:schemeClr val="tx2"/>
+                </a:solidFill>
+              </a:defRPr>
+            </a:lvl2pPr>
+            <a:lvl3pPr eaLnBrk="1" hangingPunct="1">
+              <a:defRPr>
+                <a:solidFill>
+                  <a:schemeClr val="tx2"/>
+                </a:solidFill>
+              </a:defRPr>
+            </a:lvl3pPr>
+            <a:lvl4pPr eaLnBrk="1" hangingPunct="1">
+              <a:defRPr>
+                <a:solidFill>
+                  <a:schemeClr val="tx2"/>
+                </a:solidFill>
+              </a:defRPr>
+            </a:lvl4pPr>
+            <a:lvl5pPr eaLnBrk="1" hangingPunct="1">
+              <a:defRPr>
+                <a:solidFill>
+                  <a:schemeClr val="tx2"/>
+                </a:solidFill>
+              </a:defRPr>
+            </a:lvl5pPr>
+            <a:lvl6pPr eaLnBrk="1" hangingPunct="1">
+              <a:defRPr>
+                <a:solidFill>
+                  <a:schemeClr val="tx2"/>
+                </a:solidFill>
+              </a:defRPr>
+            </a:lvl6pPr>
+            <a:lvl7pPr eaLnBrk="1" hangingPunct="1">
+              <a:defRPr>
+                <a:solidFill>
+                  <a:schemeClr val="tx2"/>
+                </a:solidFill>
+              </a:defRPr>
+            </a:lvl7pPr>
+            <a:lvl8pPr eaLnBrk="1" hangingPunct="1">
+              <a:defRPr>
+                <a:solidFill>
+                  <a:schemeClr val="tx2"/>
+                </a:solidFill>
+              </a:defRPr>
+            </a:lvl8pPr>
+            <a:lvl9pPr eaLnBrk="1" hangingPunct="1">
+              <a:defRPr>
+                <a:solidFill>
+                  <a:schemeClr val="tx2"/>
+                </a:solidFill>
+              </a:defRPr>
+            </a:lvl9pPr>
+          </a:lstStyle>
+          <a:p>
+            <a:r>
+              <a:rPr lang="en-US" dirty="0"/>
+              <a:t>MICROSERVICES</a:t>
+            </a:r>
+            <a:endParaRPr lang="tr-TR" dirty="0"/>
+          </a:p>
+        </p:txBody>
+      </p:sp>
     </p:spTree>
     <p:extLst>
       <p:ext uri="{BB962C8B-B14F-4D97-AF65-F5344CB8AC3E}">
@@ -6342,6 +6450,114 @@
           </a:p>
         </p:txBody>
       </p:sp>
+      <p:sp>
+        <p:nvSpPr>
+          <p:cNvPr id="4" name="Title 1">
+            <a:extLst>
+              <a:ext uri="{FF2B5EF4-FFF2-40B4-BE49-F238E27FC236}">
+                <a16:creationId xmlns:a16="http://schemas.microsoft.com/office/drawing/2014/main" id="{B01FFD17-7FF7-4DA1-9AEA-88027936D90B}"/>
+              </a:ext>
+            </a:extLst>
+          </p:cNvPr>
+          <p:cNvSpPr txBox="1">
+            <a:spLocks/>
+          </p:cNvSpPr>
+          <p:nvPr/>
+        </p:nvSpPr>
+        <p:spPr>
+          <a:xfrm>
+            <a:off x="8551689" y="4021296"/>
+            <a:ext cx="2404333" cy="374536"/>
+          </a:xfrm>
+          <a:prstGeom prst="rect">
+            <a:avLst/>
+          </a:prstGeom>
+        </p:spPr>
+        <p:txBody>
+          <a:bodyPr vert="horz" lIns="91440" tIns="45720" rIns="91440" bIns="45720" rtlCol="0" anchor="t">
+            <a:normAutofit fontScale="62500" lnSpcReduction="20000"/>
+          </a:bodyPr>
+          <a:lstStyle>
+            <a:lvl1pPr algn="l" defTabSz="457200" rtl="0" eaLnBrk="1" latinLnBrk="0" hangingPunct="1">
+              <a:spcBef>
+                <a:spcPct val="0"/>
+              </a:spcBef>
+              <a:buNone/>
+              <a:defRPr sz="3600" kern="1200">
+                <a:solidFill>
+                  <a:schemeClr val="accent1"/>
+                </a:solidFill>
+                <a:latin typeface="+mj-lt"/>
+                <a:ea typeface="+mj-ea"/>
+                <a:cs typeface="+mj-cs"/>
+              </a:defRPr>
+            </a:lvl1pPr>
+            <a:lvl2pPr eaLnBrk="1" hangingPunct="1">
+              <a:defRPr>
+                <a:solidFill>
+                  <a:schemeClr val="tx2"/>
+                </a:solidFill>
+              </a:defRPr>
+            </a:lvl2pPr>
+            <a:lvl3pPr eaLnBrk="1" hangingPunct="1">
+              <a:defRPr>
+                <a:solidFill>
+                  <a:schemeClr val="tx2"/>
+                </a:solidFill>
+              </a:defRPr>
+            </a:lvl3pPr>
+            <a:lvl4pPr eaLnBrk="1" hangingPunct="1">
+              <a:defRPr>
+                <a:solidFill>
+                  <a:schemeClr val="tx2"/>
+                </a:solidFill>
+              </a:defRPr>
+            </a:lvl4pPr>
+            <a:lvl5pPr eaLnBrk="1" hangingPunct="1">
+              <a:defRPr>
+                <a:solidFill>
+                  <a:schemeClr val="tx2"/>
+                </a:solidFill>
+              </a:defRPr>
+            </a:lvl5pPr>
+            <a:lvl6pPr eaLnBrk="1" hangingPunct="1">
+              <a:defRPr>
+                <a:solidFill>
+                  <a:schemeClr val="tx2"/>
+                </a:solidFill>
+              </a:defRPr>
+            </a:lvl6pPr>
+            <a:lvl7pPr eaLnBrk="1" hangingPunct="1">
+              <a:defRPr>
+                <a:solidFill>
+                  <a:schemeClr val="tx2"/>
+                </a:solidFill>
+              </a:defRPr>
+            </a:lvl7pPr>
+            <a:lvl8pPr eaLnBrk="1" hangingPunct="1">
+              <a:defRPr>
+                <a:solidFill>
+                  <a:schemeClr val="tx2"/>
+                </a:solidFill>
+              </a:defRPr>
+            </a:lvl8pPr>
+            <a:lvl9pPr eaLnBrk="1" hangingPunct="1">
+              <a:defRPr>
+                <a:solidFill>
+                  <a:schemeClr val="tx2"/>
+                </a:solidFill>
+              </a:defRPr>
+            </a:lvl9pPr>
+          </a:lstStyle>
+          <a:p>
+            <a:r>
+              <a:rPr lang="en-US" dirty="0"/>
+              <a:t>MICROSERVICES</a:t>
+            </a:r>
+            <a:endParaRPr lang="tr-TR" dirty="0"/>
+          </a:p>
+        </p:txBody>
+      </p:sp>
     </p:spTree>
     <p:extLst>
       <p:ext uri="{BB962C8B-B14F-4D97-AF65-F5344CB8AC3E}">
@@ -6837,6 +7053,114 @@
               <a:latin typeface="Arial" panose="020B0604020202020204" pitchFamily="34" charset="0"/>
               <a:cs typeface="Arial" panose="020B0604020202020204" pitchFamily="34" charset="0"/>
             </a:endParaRPr>
+          </a:p>
+        </p:txBody>
+      </p:sp>
+      <p:sp>
+        <p:nvSpPr>
+          <p:cNvPr id="4" name="Title 1">
+            <a:extLst>
+              <a:ext uri="{FF2B5EF4-FFF2-40B4-BE49-F238E27FC236}">
+                <a16:creationId xmlns:a16="http://schemas.microsoft.com/office/drawing/2014/main" id="{24B91CEA-486D-4DD0-BE54-6B4A1134EB49}"/>
+              </a:ext>
+            </a:extLst>
+          </p:cNvPr>
+          <p:cNvSpPr txBox="1">
+            <a:spLocks/>
+          </p:cNvSpPr>
+          <p:nvPr/>
+        </p:nvSpPr>
+        <p:spPr>
+          <a:xfrm>
+            <a:off x="364034" y="6378601"/>
+            <a:ext cx="2404333" cy="584261"/>
+          </a:xfrm>
+          <a:prstGeom prst="rect">
+            <a:avLst/>
+          </a:prstGeom>
+        </p:spPr>
+        <p:txBody>
+          <a:bodyPr vert="horz" lIns="91440" tIns="45720" rIns="91440" bIns="45720" rtlCol="0" anchor="t">
+            <a:normAutofit fontScale="70000" lnSpcReduction="20000"/>
+          </a:bodyPr>
+          <a:lstStyle>
+            <a:lvl1pPr algn="l" defTabSz="457200" rtl="0" eaLnBrk="1" latinLnBrk="0" hangingPunct="1">
+              <a:spcBef>
+                <a:spcPct val="0"/>
+              </a:spcBef>
+              <a:buNone/>
+              <a:defRPr sz="3600" kern="1200">
+                <a:solidFill>
+                  <a:schemeClr val="accent1"/>
+                </a:solidFill>
+                <a:latin typeface="+mj-lt"/>
+                <a:ea typeface="+mj-ea"/>
+                <a:cs typeface="+mj-cs"/>
+              </a:defRPr>
+            </a:lvl1pPr>
+            <a:lvl2pPr eaLnBrk="1" hangingPunct="1">
+              <a:defRPr>
+                <a:solidFill>
+                  <a:schemeClr val="tx2"/>
+                </a:solidFill>
+              </a:defRPr>
+            </a:lvl2pPr>
+            <a:lvl3pPr eaLnBrk="1" hangingPunct="1">
+              <a:defRPr>
+                <a:solidFill>
+                  <a:schemeClr val="tx2"/>
+                </a:solidFill>
+              </a:defRPr>
+            </a:lvl3pPr>
+            <a:lvl4pPr eaLnBrk="1" hangingPunct="1">
+              <a:defRPr>
+                <a:solidFill>
+                  <a:schemeClr val="tx2"/>
+                </a:solidFill>
+              </a:defRPr>
+            </a:lvl4pPr>
+            <a:lvl5pPr eaLnBrk="1" hangingPunct="1">
+              <a:defRPr>
+                <a:solidFill>
+                  <a:schemeClr val="tx2"/>
+                </a:solidFill>
+              </a:defRPr>
+            </a:lvl5pPr>
+            <a:lvl6pPr eaLnBrk="1" hangingPunct="1">
+              <a:defRPr>
+                <a:solidFill>
+                  <a:schemeClr val="tx2"/>
+                </a:solidFill>
+              </a:defRPr>
+            </a:lvl6pPr>
+            <a:lvl7pPr eaLnBrk="1" hangingPunct="1">
+              <a:defRPr>
+                <a:solidFill>
+                  <a:schemeClr val="tx2"/>
+                </a:solidFill>
+              </a:defRPr>
+            </a:lvl7pPr>
+            <a:lvl8pPr eaLnBrk="1" hangingPunct="1">
+              <a:defRPr>
+                <a:solidFill>
+                  <a:schemeClr val="tx2"/>
+                </a:solidFill>
+              </a:defRPr>
+            </a:lvl8pPr>
+            <a:lvl9pPr eaLnBrk="1" hangingPunct="1">
+              <a:defRPr>
+                <a:solidFill>
+                  <a:schemeClr val="tx2"/>
+                </a:solidFill>
+              </a:defRPr>
+            </a:lvl9pPr>
+          </a:lstStyle>
+          <a:p>
+            <a:r>
+              <a:rPr lang="en-US" dirty="0"/>
+              <a:t>MICROSERVICES</a:t>
+            </a:r>
+            <a:endParaRPr lang="tr-TR" dirty="0"/>
           </a:p>
         </p:txBody>
       </p:sp>
@@ -10174,6 +10498,114 @@
           </a:p>
         </p:txBody>
       </p:sp>
+      <p:sp>
+        <p:nvSpPr>
+          <p:cNvPr id="4" name="Title 1">
+            <a:extLst>
+              <a:ext uri="{FF2B5EF4-FFF2-40B4-BE49-F238E27FC236}">
+                <a16:creationId xmlns:a16="http://schemas.microsoft.com/office/drawing/2014/main" id="{FB872185-C40B-4E9E-A263-83BA460D8D67}"/>
+              </a:ext>
+            </a:extLst>
+          </p:cNvPr>
+          <p:cNvSpPr txBox="1">
+            <a:spLocks/>
+          </p:cNvSpPr>
+          <p:nvPr/>
+        </p:nvSpPr>
+        <p:spPr>
+          <a:xfrm>
+            <a:off x="428625" y="6511952"/>
+            <a:ext cx="3201287" cy="384148"/>
+          </a:xfrm>
+          <a:prstGeom prst="rect">
+            <a:avLst/>
+          </a:prstGeom>
+        </p:spPr>
+        <p:txBody>
+          <a:bodyPr vert="horz" lIns="91440" tIns="45720" rIns="91440" bIns="45720" rtlCol="0" anchor="t">
+            <a:normAutofit fontScale="55000" lnSpcReduction="20000"/>
+          </a:bodyPr>
+          <a:lstStyle>
+            <a:lvl1pPr algn="l" defTabSz="457200" rtl="0" eaLnBrk="1" latinLnBrk="0" hangingPunct="1">
+              <a:spcBef>
+                <a:spcPct val="0"/>
+              </a:spcBef>
+              <a:buNone/>
+              <a:defRPr sz="3600" kern="1200">
+                <a:solidFill>
+                  <a:schemeClr val="accent1"/>
+                </a:solidFill>
+                <a:latin typeface="+mj-lt"/>
+                <a:ea typeface="+mj-ea"/>
+                <a:cs typeface="+mj-cs"/>
+              </a:defRPr>
+            </a:lvl1pPr>
+            <a:lvl2pPr eaLnBrk="1" hangingPunct="1">
+              <a:defRPr>
+                <a:solidFill>
+                  <a:schemeClr val="tx2"/>
+                </a:solidFill>
+              </a:defRPr>
+            </a:lvl2pPr>
+            <a:lvl3pPr eaLnBrk="1" hangingPunct="1">
+              <a:defRPr>
+                <a:solidFill>
+                  <a:schemeClr val="tx2"/>
+                </a:solidFill>
+              </a:defRPr>
+            </a:lvl3pPr>
+            <a:lvl4pPr eaLnBrk="1" hangingPunct="1">
+              <a:defRPr>
+                <a:solidFill>
+                  <a:schemeClr val="tx2"/>
+                </a:solidFill>
+              </a:defRPr>
+            </a:lvl4pPr>
+            <a:lvl5pPr eaLnBrk="1" hangingPunct="1">
+              <a:defRPr>
+                <a:solidFill>
+                  <a:schemeClr val="tx2"/>
+                </a:solidFill>
+              </a:defRPr>
+            </a:lvl5pPr>
+            <a:lvl6pPr eaLnBrk="1" hangingPunct="1">
+              <a:defRPr>
+                <a:solidFill>
+                  <a:schemeClr val="tx2"/>
+                </a:solidFill>
+              </a:defRPr>
+            </a:lvl6pPr>
+            <a:lvl7pPr eaLnBrk="1" hangingPunct="1">
+              <a:defRPr>
+                <a:solidFill>
+                  <a:schemeClr val="tx2"/>
+                </a:solidFill>
+              </a:defRPr>
+            </a:lvl7pPr>
+            <a:lvl8pPr eaLnBrk="1" hangingPunct="1">
+              <a:defRPr>
+                <a:solidFill>
+                  <a:schemeClr val="tx2"/>
+                </a:solidFill>
+              </a:defRPr>
+            </a:lvl8pPr>
+            <a:lvl9pPr eaLnBrk="1" hangingPunct="1">
+              <a:defRPr>
+                <a:solidFill>
+                  <a:schemeClr val="tx2"/>
+                </a:solidFill>
+              </a:defRPr>
+            </a:lvl9pPr>
+          </a:lstStyle>
+          <a:p>
+            <a:r>
+              <a:rPr lang="en-US" dirty="0"/>
+              <a:t>SOA AND MICROSERVICES</a:t>
+            </a:r>
+            <a:endParaRPr lang="tr-TR" dirty="0"/>
+          </a:p>
+        </p:txBody>
+      </p:sp>
     </p:spTree>
     <p:extLst>
       <p:ext uri="{BB962C8B-B14F-4D97-AF65-F5344CB8AC3E}">
@@ -10232,6 +10664,114 @@
           </a:prstGeom>
         </p:spPr>
       </p:pic>
+      <p:sp>
+        <p:nvSpPr>
+          <p:cNvPr id="3" name="Title 1">
+            <a:extLst>
+              <a:ext uri="{FF2B5EF4-FFF2-40B4-BE49-F238E27FC236}">
+                <a16:creationId xmlns:a16="http://schemas.microsoft.com/office/drawing/2014/main" id="{5C53D31B-4199-4176-9279-BE31B9D4880A}"/>
+              </a:ext>
+            </a:extLst>
+          </p:cNvPr>
+          <p:cNvSpPr txBox="1">
+            <a:spLocks/>
+          </p:cNvSpPr>
+          <p:nvPr/>
+        </p:nvSpPr>
+        <p:spPr>
+          <a:xfrm>
+            <a:off x="428625" y="6511952"/>
+            <a:ext cx="3201287" cy="384148"/>
+          </a:xfrm>
+          <a:prstGeom prst="rect">
+            <a:avLst/>
+          </a:prstGeom>
+        </p:spPr>
+        <p:txBody>
+          <a:bodyPr vert="horz" lIns="91440" tIns="45720" rIns="91440" bIns="45720" rtlCol="0" anchor="t">
+            <a:normAutofit fontScale="55000" lnSpcReduction="20000"/>
+          </a:bodyPr>
+          <a:lstStyle>
+            <a:lvl1pPr algn="l" defTabSz="457200" rtl="0" eaLnBrk="1" latinLnBrk="0" hangingPunct="1">
+              <a:spcBef>
+                <a:spcPct val="0"/>
+              </a:spcBef>
+              <a:buNone/>
+              <a:defRPr sz="3600" kern="1200">
+                <a:solidFill>
+                  <a:schemeClr val="accent1"/>
+                </a:solidFill>
+                <a:latin typeface="+mj-lt"/>
+                <a:ea typeface="+mj-ea"/>
+                <a:cs typeface="+mj-cs"/>
+              </a:defRPr>
+            </a:lvl1pPr>
+            <a:lvl2pPr eaLnBrk="1" hangingPunct="1">
+              <a:defRPr>
+                <a:solidFill>
+                  <a:schemeClr val="tx2"/>
+                </a:solidFill>
+              </a:defRPr>
+            </a:lvl2pPr>
+            <a:lvl3pPr eaLnBrk="1" hangingPunct="1">
+              <a:defRPr>
+                <a:solidFill>
+                  <a:schemeClr val="tx2"/>
+                </a:solidFill>
+              </a:defRPr>
+            </a:lvl3pPr>
+            <a:lvl4pPr eaLnBrk="1" hangingPunct="1">
+              <a:defRPr>
+                <a:solidFill>
+                  <a:schemeClr val="tx2"/>
+                </a:solidFill>
+              </a:defRPr>
+            </a:lvl4pPr>
+            <a:lvl5pPr eaLnBrk="1" hangingPunct="1">
+              <a:defRPr>
+                <a:solidFill>
+                  <a:schemeClr val="tx2"/>
+                </a:solidFill>
+              </a:defRPr>
+            </a:lvl5pPr>
+            <a:lvl6pPr eaLnBrk="1" hangingPunct="1">
+              <a:defRPr>
+                <a:solidFill>
+                  <a:schemeClr val="tx2"/>
+                </a:solidFill>
+              </a:defRPr>
+            </a:lvl6pPr>
+            <a:lvl7pPr eaLnBrk="1" hangingPunct="1">
+              <a:defRPr>
+                <a:solidFill>
+                  <a:schemeClr val="tx2"/>
+                </a:solidFill>
+              </a:defRPr>
+            </a:lvl7pPr>
+            <a:lvl8pPr eaLnBrk="1" hangingPunct="1">
+              <a:defRPr>
+                <a:solidFill>
+                  <a:schemeClr val="tx2"/>
+                </a:solidFill>
+              </a:defRPr>
+            </a:lvl8pPr>
+            <a:lvl9pPr eaLnBrk="1" hangingPunct="1">
+              <a:defRPr>
+                <a:solidFill>
+                  <a:schemeClr val="tx2"/>
+                </a:solidFill>
+              </a:defRPr>
+            </a:lvl9pPr>
+          </a:lstStyle>
+          <a:p>
+            <a:r>
+              <a:rPr lang="en-US" dirty="0"/>
+              <a:t>SOA AND MICROSERVICES</a:t>
+            </a:r>
+            <a:endParaRPr lang="tr-TR" dirty="0"/>
+          </a:p>
+        </p:txBody>
+      </p:sp>
     </p:spTree>
     <p:extLst>
       <p:ext uri="{BB962C8B-B14F-4D97-AF65-F5344CB8AC3E}">
@@ -10292,19 +10832,16 @@
               <a:buNone/>
             </a:pPr>
             <a:r>
-              <a:rPr lang="en-US" b="1" dirty="0" err="1">
-                <a:latin typeface="Arial" panose="020B0604020202020204" pitchFamily="34" charset="0"/>
-                <a:cs typeface="Arial" panose="020B0604020202020204" pitchFamily="34" charset="0"/>
-              </a:rPr>
-              <a:t>Kaynaklar</a:t>
-            </a:r>
-            <a:r>
-              <a:rPr lang="en-US" b="1" dirty="0">
-                <a:latin typeface="Arial" panose="020B0604020202020204" pitchFamily="34" charset="0"/>
-                <a:cs typeface="Arial" panose="020B0604020202020204" pitchFamily="34" charset="0"/>
-              </a:rPr>
-              <a:t>:</a:t>
-            </a:r>
+              <a:rPr lang="en-US" b="1">
+                <a:latin typeface="Arial" panose="020B0604020202020204" pitchFamily="34" charset="0"/>
+                <a:cs typeface="Arial" panose="020B0604020202020204" pitchFamily="34" charset="0"/>
+              </a:rPr>
+              <a:t>KAYNAKLAR:</a:t>
+            </a:r>
+            <a:endParaRPr lang="en-US" b="1" dirty="0">
+              <a:latin typeface="Arial" panose="020B0604020202020204" pitchFamily="34" charset="0"/>
+              <a:cs typeface="Arial" panose="020B0604020202020204" pitchFamily="34" charset="0"/>
+            </a:endParaRPr>
           </a:p>
           <a:p>
             <a:pPr>
@@ -11204,6 +11741,114 @@
           </a:p>
         </p:txBody>
       </p:sp>
+      <p:sp>
+        <p:nvSpPr>
+          <p:cNvPr id="7" name="Title 1">
+            <a:extLst>
+              <a:ext uri="{FF2B5EF4-FFF2-40B4-BE49-F238E27FC236}">
+                <a16:creationId xmlns:a16="http://schemas.microsoft.com/office/drawing/2014/main" id="{90B2E695-11D0-4B7F-87E5-A6FFFA22E529}"/>
+              </a:ext>
+            </a:extLst>
+          </p:cNvPr>
+          <p:cNvSpPr txBox="1">
+            <a:spLocks/>
+          </p:cNvSpPr>
+          <p:nvPr/>
+        </p:nvSpPr>
+        <p:spPr>
+          <a:xfrm>
+            <a:off x="364034" y="6378601"/>
+            <a:ext cx="1023395" cy="584261"/>
+          </a:xfrm>
+          <a:prstGeom prst="rect">
+            <a:avLst/>
+          </a:prstGeom>
+        </p:spPr>
+        <p:txBody>
+          <a:bodyPr vert="horz" lIns="91440" tIns="45720" rIns="91440" bIns="45720" rtlCol="0" anchor="t">
+            <a:normAutofit fontScale="92500" lnSpcReduction="10000"/>
+          </a:bodyPr>
+          <a:lstStyle>
+            <a:lvl1pPr algn="l" defTabSz="457200" rtl="0" eaLnBrk="1" latinLnBrk="0" hangingPunct="1">
+              <a:spcBef>
+                <a:spcPct val="0"/>
+              </a:spcBef>
+              <a:buNone/>
+              <a:defRPr sz="3600" kern="1200">
+                <a:solidFill>
+                  <a:schemeClr val="accent1"/>
+                </a:solidFill>
+                <a:latin typeface="+mj-lt"/>
+                <a:ea typeface="+mj-ea"/>
+                <a:cs typeface="+mj-cs"/>
+              </a:defRPr>
+            </a:lvl1pPr>
+            <a:lvl2pPr eaLnBrk="1" hangingPunct="1">
+              <a:defRPr>
+                <a:solidFill>
+                  <a:schemeClr val="tx2"/>
+                </a:solidFill>
+              </a:defRPr>
+            </a:lvl2pPr>
+            <a:lvl3pPr eaLnBrk="1" hangingPunct="1">
+              <a:defRPr>
+                <a:solidFill>
+                  <a:schemeClr val="tx2"/>
+                </a:solidFill>
+              </a:defRPr>
+            </a:lvl3pPr>
+            <a:lvl4pPr eaLnBrk="1" hangingPunct="1">
+              <a:defRPr>
+                <a:solidFill>
+                  <a:schemeClr val="tx2"/>
+                </a:solidFill>
+              </a:defRPr>
+            </a:lvl4pPr>
+            <a:lvl5pPr eaLnBrk="1" hangingPunct="1">
+              <a:defRPr>
+                <a:solidFill>
+                  <a:schemeClr val="tx2"/>
+                </a:solidFill>
+              </a:defRPr>
+            </a:lvl5pPr>
+            <a:lvl6pPr eaLnBrk="1" hangingPunct="1">
+              <a:defRPr>
+                <a:solidFill>
+                  <a:schemeClr val="tx2"/>
+                </a:solidFill>
+              </a:defRPr>
+            </a:lvl6pPr>
+            <a:lvl7pPr eaLnBrk="1" hangingPunct="1">
+              <a:defRPr>
+                <a:solidFill>
+                  <a:schemeClr val="tx2"/>
+                </a:solidFill>
+              </a:defRPr>
+            </a:lvl7pPr>
+            <a:lvl8pPr eaLnBrk="1" hangingPunct="1">
+              <a:defRPr>
+                <a:solidFill>
+                  <a:schemeClr val="tx2"/>
+                </a:solidFill>
+              </a:defRPr>
+            </a:lvl8pPr>
+            <a:lvl9pPr eaLnBrk="1" hangingPunct="1">
+              <a:defRPr>
+                <a:solidFill>
+                  <a:schemeClr val="tx2"/>
+                </a:solidFill>
+              </a:defRPr>
+            </a:lvl9pPr>
+          </a:lstStyle>
+          <a:p>
+            <a:r>
+              <a:rPr lang="en-US" dirty="0"/>
+              <a:t>SOA</a:t>
+            </a:r>
+            <a:endParaRPr lang="tr-TR" dirty="0"/>
+          </a:p>
+        </p:txBody>
+      </p:sp>
     </p:spTree>
     <p:extLst>
       <p:ext uri="{BB962C8B-B14F-4D97-AF65-F5344CB8AC3E}">
@@ -11529,6 +12174,114 @@
               </a:rPr>
               <a:t>Hizmet sağlayıcı, başkalarının kullanabileceği bir veya daha fazla hizmeti oluşturur, sürdürür ve sağlar. Kuruluşlar kendi hizmetlerini oluşturabilir veya bunları üçüncü taraf hizmet satıcılarından satın alabilir.</a:t>
             </a:r>
+          </a:p>
+        </p:txBody>
+      </p:sp>
+      <p:sp>
+        <p:nvSpPr>
+          <p:cNvPr id="4" name="Title 1">
+            <a:extLst>
+              <a:ext uri="{FF2B5EF4-FFF2-40B4-BE49-F238E27FC236}">
+                <a16:creationId xmlns:a16="http://schemas.microsoft.com/office/drawing/2014/main" id="{8D48C2A6-7649-42F5-9A5D-7B187025C597}"/>
+              </a:ext>
+            </a:extLst>
+          </p:cNvPr>
+          <p:cNvSpPr txBox="1">
+            <a:spLocks/>
+          </p:cNvSpPr>
+          <p:nvPr/>
+        </p:nvSpPr>
+        <p:spPr>
+          <a:xfrm>
+            <a:off x="364034" y="6378601"/>
+            <a:ext cx="1023395" cy="584261"/>
+          </a:xfrm>
+          <a:prstGeom prst="rect">
+            <a:avLst/>
+          </a:prstGeom>
+        </p:spPr>
+        <p:txBody>
+          <a:bodyPr vert="horz" lIns="91440" tIns="45720" rIns="91440" bIns="45720" rtlCol="0" anchor="t">
+            <a:normAutofit fontScale="92500" lnSpcReduction="10000"/>
+          </a:bodyPr>
+          <a:lstStyle>
+            <a:lvl1pPr algn="l" defTabSz="457200" rtl="0" eaLnBrk="1" latinLnBrk="0" hangingPunct="1">
+              <a:spcBef>
+                <a:spcPct val="0"/>
+              </a:spcBef>
+              <a:buNone/>
+              <a:defRPr sz="3600" kern="1200">
+                <a:solidFill>
+                  <a:schemeClr val="accent1"/>
+                </a:solidFill>
+                <a:latin typeface="+mj-lt"/>
+                <a:ea typeface="+mj-ea"/>
+                <a:cs typeface="+mj-cs"/>
+              </a:defRPr>
+            </a:lvl1pPr>
+            <a:lvl2pPr eaLnBrk="1" hangingPunct="1">
+              <a:defRPr>
+                <a:solidFill>
+                  <a:schemeClr val="tx2"/>
+                </a:solidFill>
+              </a:defRPr>
+            </a:lvl2pPr>
+            <a:lvl3pPr eaLnBrk="1" hangingPunct="1">
+              <a:defRPr>
+                <a:solidFill>
+                  <a:schemeClr val="tx2"/>
+                </a:solidFill>
+              </a:defRPr>
+            </a:lvl3pPr>
+            <a:lvl4pPr eaLnBrk="1" hangingPunct="1">
+              <a:defRPr>
+                <a:solidFill>
+                  <a:schemeClr val="tx2"/>
+                </a:solidFill>
+              </a:defRPr>
+            </a:lvl4pPr>
+            <a:lvl5pPr eaLnBrk="1" hangingPunct="1">
+              <a:defRPr>
+                <a:solidFill>
+                  <a:schemeClr val="tx2"/>
+                </a:solidFill>
+              </a:defRPr>
+            </a:lvl5pPr>
+            <a:lvl6pPr eaLnBrk="1" hangingPunct="1">
+              <a:defRPr>
+                <a:solidFill>
+                  <a:schemeClr val="tx2"/>
+                </a:solidFill>
+              </a:defRPr>
+            </a:lvl6pPr>
+            <a:lvl7pPr eaLnBrk="1" hangingPunct="1">
+              <a:defRPr>
+                <a:solidFill>
+                  <a:schemeClr val="tx2"/>
+                </a:solidFill>
+              </a:defRPr>
+            </a:lvl7pPr>
+            <a:lvl8pPr eaLnBrk="1" hangingPunct="1">
+              <a:defRPr>
+                <a:solidFill>
+                  <a:schemeClr val="tx2"/>
+                </a:solidFill>
+              </a:defRPr>
+            </a:lvl8pPr>
+            <a:lvl9pPr eaLnBrk="1" hangingPunct="1">
+              <a:defRPr>
+                <a:solidFill>
+                  <a:schemeClr val="tx2"/>
+                </a:solidFill>
+              </a:defRPr>
+            </a:lvl9pPr>
+          </a:lstStyle>
+          <a:p>
+            <a:r>
+              <a:rPr lang="en-US" dirty="0"/>
+              <a:t>SOA</a:t>
+            </a:r>
+            <a:endParaRPr lang="tr-TR" dirty="0"/>
           </a:p>
         </p:txBody>
       </p:sp>
@@ -11807,6 +12560,114 @@
             </a:r>
           </a:p>
           <a:p>
+            <a:endParaRPr lang="tr-TR" dirty="0"/>
+          </a:p>
+        </p:txBody>
+      </p:sp>
+      <p:sp>
+        <p:nvSpPr>
+          <p:cNvPr id="4" name="Title 1">
+            <a:extLst>
+              <a:ext uri="{FF2B5EF4-FFF2-40B4-BE49-F238E27FC236}">
+                <a16:creationId xmlns:a16="http://schemas.microsoft.com/office/drawing/2014/main" id="{92F133CD-FA35-48EF-8688-673D25ABEC02}"/>
+              </a:ext>
+            </a:extLst>
+          </p:cNvPr>
+          <p:cNvSpPr txBox="1">
+            <a:spLocks/>
+          </p:cNvSpPr>
+          <p:nvPr/>
+        </p:nvSpPr>
+        <p:spPr>
+          <a:xfrm>
+            <a:off x="364034" y="6378601"/>
+            <a:ext cx="1023395" cy="584261"/>
+          </a:xfrm>
+          <a:prstGeom prst="rect">
+            <a:avLst/>
+          </a:prstGeom>
+        </p:spPr>
+        <p:txBody>
+          <a:bodyPr vert="horz" lIns="91440" tIns="45720" rIns="91440" bIns="45720" rtlCol="0" anchor="t">
+            <a:normAutofit fontScale="92500" lnSpcReduction="10000"/>
+          </a:bodyPr>
+          <a:lstStyle>
+            <a:lvl1pPr algn="l" defTabSz="457200" rtl="0" eaLnBrk="1" latinLnBrk="0" hangingPunct="1">
+              <a:spcBef>
+                <a:spcPct val="0"/>
+              </a:spcBef>
+              <a:buNone/>
+              <a:defRPr sz="3600" kern="1200">
+                <a:solidFill>
+                  <a:schemeClr val="accent1"/>
+                </a:solidFill>
+                <a:latin typeface="+mj-lt"/>
+                <a:ea typeface="+mj-ea"/>
+                <a:cs typeface="+mj-cs"/>
+              </a:defRPr>
+            </a:lvl1pPr>
+            <a:lvl2pPr eaLnBrk="1" hangingPunct="1">
+              <a:defRPr>
+                <a:solidFill>
+                  <a:schemeClr val="tx2"/>
+                </a:solidFill>
+              </a:defRPr>
+            </a:lvl2pPr>
+            <a:lvl3pPr eaLnBrk="1" hangingPunct="1">
+              <a:defRPr>
+                <a:solidFill>
+                  <a:schemeClr val="tx2"/>
+                </a:solidFill>
+              </a:defRPr>
+            </a:lvl3pPr>
+            <a:lvl4pPr eaLnBrk="1" hangingPunct="1">
+              <a:defRPr>
+                <a:solidFill>
+                  <a:schemeClr val="tx2"/>
+                </a:solidFill>
+              </a:defRPr>
+            </a:lvl4pPr>
+            <a:lvl5pPr eaLnBrk="1" hangingPunct="1">
+              <a:defRPr>
+                <a:solidFill>
+                  <a:schemeClr val="tx2"/>
+                </a:solidFill>
+              </a:defRPr>
+            </a:lvl5pPr>
+            <a:lvl6pPr eaLnBrk="1" hangingPunct="1">
+              <a:defRPr>
+                <a:solidFill>
+                  <a:schemeClr val="tx2"/>
+                </a:solidFill>
+              </a:defRPr>
+            </a:lvl6pPr>
+            <a:lvl7pPr eaLnBrk="1" hangingPunct="1">
+              <a:defRPr>
+                <a:solidFill>
+                  <a:schemeClr val="tx2"/>
+                </a:solidFill>
+              </a:defRPr>
+            </a:lvl7pPr>
+            <a:lvl8pPr eaLnBrk="1" hangingPunct="1">
+              <a:defRPr>
+                <a:solidFill>
+                  <a:schemeClr val="tx2"/>
+                </a:solidFill>
+              </a:defRPr>
+            </a:lvl8pPr>
+            <a:lvl9pPr eaLnBrk="1" hangingPunct="1">
+              <a:defRPr>
+                <a:solidFill>
+                  <a:schemeClr val="tx2"/>
+                </a:solidFill>
+              </a:defRPr>
+            </a:lvl9pPr>
+          </a:lstStyle>
+          <a:p>
+            <a:r>
+              <a:rPr lang="en-US" dirty="0"/>
+              <a:t>SOA</a:t>
+            </a:r>
             <a:endParaRPr lang="tr-TR" dirty="0"/>
           </a:p>
         </p:txBody>
@@ -12109,6 +12970,114 @@
           </a:p>
         </p:txBody>
       </p:sp>
+      <p:sp>
+        <p:nvSpPr>
+          <p:cNvPr id="6" name="Title 1">
+            <a:extLst>
+              <a:ext uri="{FF2B5EF4-FFF2-40B4-BE49-F238E27FC236}">
+                <a16:creationId xmlns:a16="http://schemas.microsoft.com/office/drawing/2014/main" id="{011DE8A7-E886-4A89-93BA-DDCE7589EC51}"/>
+              </a:ext>
+            </a:extLst>
+          </p:cNvPr>
+          <p:cNvSpPr txBox="1">
+            <a:spLocks/>
+          </p:cNvSpPr>
+          <p:nvPr/>
+        </p:nvSpPr>
+        <p:spPr>
+          <a:xfrm>
+            <a:off x="364034" y="6378601"/>
+            <a:ext cx="1023395" cy="584261"/>
+          </a:xfrm>
+          <a:prstGeom prst="rect">
+            <a:avLst/>
+          </a:prstGeom>
+        </p:spPr>
+        <p:txBody>
+          <a:bodyPr vert="horz" lIns="91440" tIns="45720" rIns="91440" bIns="45720" rtlCol="0" anchor="t">
+            <a:normAutofit fontScale="92500" lnSpcReduction="10000"/>
+          </a:bodyPr>
+          <a:lstStyle>
+            <a:lvl1pPr algn="l" defTabSz="457200" rtl="0" eaLnBrk="1" latinLnBrk="0" hangingPunct="1">
+              <a:spcBef>
+                <a:spcPct val="0"/>
+              </a:spcBef>
+              <a:buNone/>
+              <a:defRPr sz="3600" kern="1200">
+                <a:solidFill>
+                  <a:schemeClr val="accent1"/>
+                </a:solidFill>
+                <a:latin typeface="+mj-lt"/>
+                <a:ea typeface="+mj-ea"/>
+                <a:cs typeface="+mj-cs"/>
+              </a:defRPr>
+            </a:lvl1pPr>
+            <a:lvl2pPr eaLnBrk="1" hangingPunct="1">
+              <a:defRPr>
+                <a:solidFill>
+                  <a:schemeClr val="tx2"/>
+                </a:solidFill>
+              </a:defRPr>
+            </a:lvl2pPr>
+            <a:lvl3pPr eaLnBrk="1" hangingPunct="1">
+              <a:defRPr>
+                <a:solidFill>
+                  <a:schemeClr val="tx2"/>
+                </a:solidFill>
+              </a:defRPr>
+            </a:lvl3pPr>
+            <a:lvl4pPr eaLnBrk="1" hangingPunct="1">
+              <a:defRPr>
+                <a:solidFill>
+                  <a:schemeClr val="tx2"/>
+                </a:solidFill>
+              </a:defRPr>
+            </a:lvl4pPr>
+            <a:lvl5pPr eaLnBrk="1" hangingPunct="1">
+              <a:defRPr>
+                <a:solidFill>
+                  <a:schemeClr val="tx2"/>
+                </a:solidFill>
+              </a:defRPr>
+            </a:lvl5pPr>
+            <a:lvl6pPr eaLnBrk="1" hangingPunct="1">
+              <a:defRPr>
+                <a:solidFill>
+                  <a:schemeClr val="tx2"/>
+                </a:solidFill>
+              </a:defRPr>
+            </a:lvl6pPr>
+            <a:lvl7pPr eaLnBrk="1" hangingPunct="1">
+              <a:defRPr>
+                <a:solidFill>
+                  <a:schemeClr val="tx2"/>
+                </a:solidFill>
+              </a:defRPr>
+            </a:lvl7pPr>
+            <a:lvl8pPr eaLnBrk="1" hangingPunct="1">
+              <a:defRPr>
+                <a:solidFill>
+                  <a:schemeClr val="tx2"/>
+                </a:solidFill>
+              </a:defRPr>
+            </a:lvl8pPr>
+            <a:lvl9pPr eaLnBrk="1" hangingPunct="1">
+              <a:defRPr>
+                <a:solidFill>
+                  <a:schemeClr val="tx2"/>
+                </a:solidFill>
+              </a:defRPr>
+            </a:lvl9pPr>
+          </a:lstStyle>
+          <a:p>
+            <a:r>
+              <a:rPr lang="en-US" dirty="0"/>
+              <a:t>SOA</a:t>
+            </a:r>
+            <a:endParaRPr lang="tr-TR" dirty="0"/>
+          </a:p>
+        </p:txBody>
+      </p:sp>
     </p:spTree>
     <p:extLst>
       <p:ext uri="{BB962C8B-B14F-4D97-AF65-F5344CB8AC3E}">
@@ -12358,6 +13327,114 @@
               <a:buNone/>
             </a:pPr>
             <a:endParaRPr lang="en-US" dirty="0"/>
+          </a:p>
+        </p:txBody>
+      </p:sp>
+      <p:sp>
+        <p:nvSpPr>
+          <p:cNvPr id="4" name="Title 1">
+            <a:extLst>
+              <a:ext uri="{FF2B5EF4-FFF2-40B4-BE49-F238E27FC236}">
+                <a16:creationId xmlns:a16="http://schemas.microsoft.com/office/drawing/2014/main" id="{A91C5B69-F25A-47EE-A2B1-E0F2152E6F32}"/>
+              </a:ext>
+            </a:extLst>
+          </p:cNvPr>
+          <p:cNvSpPr txBox="1">
+            <a:spLocks/>
+          </p:cNvSpPr>
+          <p:nvPr/>
+        </p:nvSpPr>
+        <p:spPr>
+          <a:xfrm>
+            <a:off x="364034" y="6378601"/>
+            <a:ext cx="1023395" cy="584261"/>
+          </a:xfrm>
+          <a:prstGeom prst="rect">
+            <a:avLst/>
+          </a:prstGeom>
+        </p:spPr>
+        <p:txBody>
+          <a:bodyPr vert="horz" lIns="91440" tIns="45720" rIns="91440" bIns="45720" rtlCol="0" anchor="t">
+            <a:normAutofit fontScale="92500" lnSpcReduction="10000"/>
+          </a:bodyPr>
+          <a:lstStyle>
+            <a:lvl1pPr algn="l" defTabSz="457200" rtl="0" eaLnBrk="1" latinLnBrk="0" hangingPunct="1">
+              <a:spcBef>
+                <a:spcPct val="0"/>
+              </a:spcBef>
+              <a:buNone/>
+              <a:defRPr sz="3600" kern="1200">
+                <a:solidFill>
+                  <a:schemeClr val="accent1"/>
+                </a:solidFill>
+                <a:latin typeface="+mj-lt"/>
+                <a:ea typeface="+mj-ea"/>
+                <a:cs typeface="+mj-cs"/>
+              </a:defRPr>
+            </a:lvl1pPr>
+            <a:lvl2pPr eaLnBrk="1" hangingPunct="1">
+              <a:defRPr>
+                <a:solidFill>
+                  <a:schemeClr val="tx2"/>
+                </a:solidFill>
+              </a:defRPr>
+            </a:lvl2pPr>
+            <a:lvl3pPr eaLnBrk="1" hangingPunct="1">
+              <a:defRPr>
+                <a:solidFill>
+                  <a:schemeClr val="tx2"/>
+                </a:solidFill>
+              </a:defRPr>
+            </a:lvl3pPr>
+            <a:lvl4pPr eaLnBrk="1" hangingPunct="1">
+              <a:defRPr>
+                <a:solidFill>
+                  <a:schemeClr val="tx2"/>
+                </a:solidFill>
+              </a:defRPr>
+            </a:lvl4pPr>
+            <a:lvl5pPr eaLnBrk="1" hangingPunct="1">
+              <a:defRPr>
+                <a:solidFill>
+                  <a:schemeClr val="tx2"/>
+                </a:solidFill>
+              </a:defRPr>
+            </a:lvl5pPr>
+            <a:lvl6pPr eaLnBrk="1" hangingPunct="1">
+              <a:defRPr>
+                <a:solidFill>
+                  <a:schemeClr val="tx2"/>
+                </a:solidFill>
+              </a:defRPr>
+            </a:lvl6pPr>
+            <a:lvl7pPr eaLnBrk="1" hangingPunct="1">
+              <a:defRPr>
+                <a:solidFill>
+                  <a:schemeClr val="tx2"/>
+                </a:solidFill>
+              </a:defRPr>
+            </a:lvl7pPr>
+            <a:lvl8pPr eaLnBrk="1" hangingPunct="1">
+              <a:defRPr>
+                <a:solidFill>
+                  <a:schemeClr val="tx2"/>
+                </a:solidFill>
+              </a:defRPr>
+            </a:lvl8pPr>
+            <a:lvl9pPr eaLnBrk="1" hangingPunct="1">
+              <a:defRPr>
+                <a:solidFill>
+                  <a:schemeClr val="tx2"/>
+                </a:solidFill>
+              </a:defRPr>
+            </a:lvl9pPr>
+          </a:lstStyle>
+          <a:p>
+            <a:r>
+              <a:rPr lang="en-US" dirty="0"/>
+              <a:t>SOA</a:t>
+            </a:r>
+            <a:endParaRPr lang="tr-TR" dirty="0"/>
           </a:p>
         </p:txBody>
       </p:sp>
@@ -12846,6 +13923,114 @@
           </a:p>
         </p:txBody>
       </p:sp>
+      <p:sp>
+        <p:nvSpPr>
+          <p:cNvPr id="4" name="Title 1">
+            <a:extLst>
+              <a:ext uri="{FF2B5EF4-FFF2-40B4-BE49-F238E27FC236}">
+                <a16:creationId xmlns:a16="http://schemas.microsoft.com/office/drawing/2014/main" id="{DB01DF86-B688-4EAF-B636-F81EE7564269}"/>
+              </a:ext>
+            </a:extLst>
+          </p:cNvPr>
+          <p:cNvSpPr txBox="1">
+            <a:spLocks/>
+          </p:cNvSpPr>
+          <p:nvPr/>
+        </p:nvSpPr>
+        <p:spPr>
+          <a:xfrm>
+            <a:off x="364034" y="6378601"/>
+            <a:ext cx="1023395" cy="584261"/>
+          </a:xfrm>
+          <a:prstGeom prst="rect">
+            <a:avLst/>
+          </a:prstGeom>
+        </p:spPr>
+        <p:txBody>
+          <a:bodyPr vert="horz" lIns="91440" tIns="45720" rIns="91440" bIns="45720" rtlCol="0" anchor="t">
+            <a:normAutofit fontScale="92500" lnSpcReduction="10000"/>
+          </a:bodyPr>
+          <a:lstStyle>
+            <a:lvl1pPr algn="l" defTabSz="457200" rtl="0" eaLnBrk="1" latinLnBrk="0" hangingPunct="1">
+              <a:spcBef>
+                <a:spcPct val="0"/>
+              </a:spcBef>
+              <a:buNone/>
+              <a:defRPr sz="3600" kern="1200">
+                <a:solidFill>
+                  <a:schemeClr val="accent1"/>
+                </a:solidFill>
+                <a:latin typeface="+mj-lt"/>
+                <a:ea typeface="+mj-ea"/>
+                <a:cs typeface="+mj-cs"/>
+              </a:defRPr>
+            </a:lvl1pPr>
+            <a:lvl2pPr eaLnBrk="1" hangingPunct="1">
+              <a:defRPr>
+                <a:solidFill>
+                  <a:schemeClr val="tx2"/>
+                </a:solidFill>
+              </a:defRPr>
+            </a:lvl2pPr>
+            <a:lvl3pPr eaLnBrk="1" hangingPunct="1">
+              <a:defRPr>
+                <a:solidFill>
+                  <a:schemeClr val="tx2"/>
+                </a:solidFill>
+              </a:defRPr>
+            </a:lvl3pPr>
+            <a:lvl4pPr eaLnBrk="1" hangingPunct="1">
+              <a:defRPr>
+                <a:solidFill>
+                  <a:schemeClr val="tx2"/>
+                </a:solidFill>
+              </a:defRPr>
+            </a:lvl4pPr>
+            <a:lvl5pPr eaLnBrk="1" hangingPunct="1">
+              <a:defRPr>
+                <a:solidFill>
+                  <a:schemeClr val="tx2"/>
+                </a:solidFill>
+              </a:defRPr>
+            </a:lvl5pPr>
+            <a:lvl6pPr eaLnBrk="1" hangingPunct="1">
+              <a:defRPr>
+                <a:solidFill>
+                  <a:schemeClr val="tx2"/>
+                </a:solidFill>
+              </a:defRPr>
+            </a:lvl6pPr>
+            <a:lvl7pPr eaLnBrk="1" hangingPunct="1">
+              <a:defRPr>
+                <a:solidFill>
+                  <a:schemeClr val="tx2"/>
+                </a:solidFill>
+              </a:defRPr>
+            </a:lvl7pPr>
+            <a:lvl8pPr eaLnBrk="1" hangingPunct="1">
+              <a:defRPr>
+                <a:solidFill>
+                  <a:schemeClr val="tx2"/>
+                </a:solidFill>
+              </a:defRPr>
+            </a:lvl8pPr>
+            <a:lvl9pPr eaLnBrk="1" hangingPunct="1">
+              <a:defRPr>
+                <a:solidFill>
+                  <a:schemeClr val="tx2"/>
+                </a:solidFill>
+              </a:defRPr>
+            </a:lvl9pPr>
+          </a:lstStyle>
+          <a:p>
+            <a:r>
+              <a:rPr lang="en-US" dirty="0"/>
+              <a:t>SOA</a:t>
+            </a:r>
+            <a:endParaRPr lang="tr-TR" dirty="0"/>
+          </a:p>
+        </p:txBody>
+      </p:sp>
     </p:spTree>
     <p:extLst>
       <p:ext uri="{BB962C8B-B14F-4D97-AF65-F5344CB8AC3E}">
@@ -12955,7 +14140,7 @@
         <p:spPr>
           <a:xfrm>
             <a:off x="489382" y="4200436"/>
-            <a:ext cx="8852544" cy="923330"/>
+            <a:ext cx="8852544" cy="2585323"/>
           </a:xfrm>
           <a:prstGeom prst="rect">
             <a:avLst/>
@@ -12974,7 +14159,7 @@
                 <a:ea typeface="Calibri" panose="020F0502020204030204" pitchFamily="34" charset="0"/>
                 <a:cs typeface="Arial" panose="020B0604020202020204" pitchFamily="34" charset="0"/>
               </a:rPr>
-              <a:t>Bir </a:t>
+              <a:t>	Bir </a:t>
             </a:r>
             <a:r>
               <a:rPr lang="en-US" dirty="0" err="1">
@@ -13368,6 +14553,104 @@
               </a:rPr>
               <a:t>kalıptır</a:t>
             </a:r>
+            <a:r>
+              <a:rPr lang="en-US" dirty="0">
+                <a:latin typeface="Arial" panose="020B0604020202020204" pitchFamily="34" charset="0"/>
+                <a:ea typeface="Calibri" panose="020F0502020204030204" pitchFamily="34" charset="0"/>
+                <a:cs typeface="Arial" panose="020B0604020202020204" pitchFamily="34" charset="0"/>
+              </a:rPr>
+              <a:t>.</a:t>
+            </a:r>
+          </a:p>
+          <a:p>
+            <a:pPr algn="just"/>
+            <a:r>
+              <a:rPr lang="en-US" dirty="0"/>
+              <a:t>	</a:t>
+            </a:r>
+            <a:r>
+              <a:rPr lang="tr-TR" dirty="0"/>
+              <a:t>Mikro </a:t>
+            </a:r>
+            <a:r>
+              <a:rPr lang="en-US" dirty="0" err="1"/>
+              <a:t>servis</a:t>
+            </a:r>
+            <a:r>
+              <a:rPr lang="tr-TR" dirty="0"/>
+              <a:t> modeli, bir SOA </a:t>
+            </a:r>
+            <a:r>
+              <a:rPr lang="en-US" dirty="0" err="1"/>
+              <a:t>servisini</a:t>
+            </a:r>
+            <a:r>
+              <a:rPr lang="tr-TR" dirty="0"/>
+              <a:t> daha küçük </a:t>
+            </a:r>
+            <a:r>
+              <a:rPr lang="en-US" dirty="0" err="1"/>
+              <a:t>servis</a:t>
+            </a:r>
+            <a:r>
+              <a:rPr lang="tr-TR" dirty="0" err="1"/>
+              <a:t>lere</a:t>
+            </a:r>
+            <a:r>
+              <a:rPr lang="tr-TR" dirty="0"/>
+              <a:t> böler. Her mikro </a:t>
+            </a:r>
+            <a:r>
+              <a:rPr lang="en-US" dirty="0" err="1"/>
+              <a:t>servis</a:t>
+            </a:r>
+            <a:r>
+              <a:rPr lang="tr-TR" dirty="0"/>
+              <a:t> kendi sınırlı bağlamı içinde çalışır ve diğer </a:t>
+            </a:r>
+            <a:r>
+              <a:rPr lang="en-US" dirty="0" err="1"/>
+              <a:t>servis</a:t>
+            </a:r>
+            <a:r>
+              <a:rPr lang="tr-TR" dirty="0" err="1"/>
+              <a:t>lerden</a:t>
+            </a:r>
+            <a:r>
+              <a:rPr lang="tr-TR" dirty="0"/>
+              <a:t> bağımsız olarak çalışır. Kısacası, mikro </a:t>
+            </a:r>
+            <a:r>
+              <a:rPr lang="en-US" dirty="0" err="1"/>
+              <a:t>servis</a:t>
+            </a:r>
+            <a:r>
+              <a:rPr lang="tr-TR" dirty="0"/>
+              <a:t> mimarisi bireysel </a:t>
+            </a:r>
+            <a:r>
+              <a:rPr lang="en-US" dirty="0" err="1"/>
+              <a:t>servisler</a:t>
+            </a:r>
+            <a:r>
+              <a:rPr lang="tr-TR" dirty="0"/>
+              <a:t> arasında sınırlı bir bağımlılığa sahiptir veya hiç yoktur ve sistem çapında arıza</a:t>
+            </a:r>
+            <a:r>
+              <a:rPr lang="en-US" dirty="0"/>
+              <a:t>(system failure)</a:t>
+            </a:r>
+            <a:r>
+              <a:rPr lang="tr-TR" dirty="0"/>
+              <a:t> riskini azaltır.</a:t>
+            </a:r>
+            <a:endParaRPr lang="en-US" dirty="0">
+              <a:latin typeface="Arial" panose="020B0604020202020204" pitchFamily="34" charset="0"/>
+              <a:cs typeface="Arial" panose="020B0604020202020204" pitchFamily="34" charset="0"/>
+            </a:endParaRPr>
+          </a:p>
+          <a:p>
+            <a:pPr algn="just"/>
             <a:endParaRPr lang="tr-TR" dirty="0">
               <a:latin typeface="Arial" panose="020B0604020202020204" pitchFamily="34" charset="0"/>
               <a:cs typeface="Arial" panose="020B0604020202020204" pitchFamily="34" charset="0"/>

</xml_diff>

<commit_message>
Kurumsal yazilim mimarileri sunumu duzeltmeler yapildi 2
</commit_message>
<xml_diff>
--- a/presentations/EnterpriseSoftwareArchitectures.pptx
+++ b/presentations/EnterpriseSoftwareArchitectures.pptx
@@ -20,7 +20,10 @@
     <p:sldId id="269" r:id="rId14"/>
     <p:sldId id="270" r:id="rId15"/>
     <p:sldId id="271" r:id="rId16"/>
-    <p:sldId id="264" r:id="rId17"/>
+    <p:sldId id="272" r:id="rId17"/>
+    <p:sldId id="273" r:id="rId18"/>
+    <p:sldId id="274" r:id="rId19"/>
+    <p:sldId id="264" r:id="rId20"/>
   </p:sldIdLst>
   <p:sldSz cx="12192000" cy="6858000"/>
   <p:notesSz cx="6858000" cy="9144000"/>
@@ -10804,6 +10807,994 @@
       </p:grpSpPr>
       <p:sp>
         <p:nvSpPr>
+          <p:cNvPr id="2" name="Title 1">
+            <a:extLst>
+              <a:ext uri="{FF2B5EF4-FFF2-40B4-BE49-F238E27FC236}">
+                <a16:creationId xmlns:a16="http://schemas.microsoft.com/office/drawing/2014/main" id="{056F4214-4109-4451-914D-80C6CDEEB21E}"/>
+              </a:ext>
+            </a:extLst>
+          </p:cNvPr>
+          <p:cNvSpPr>
+            <a:spLocks noGrp="1"/>
+          </p:cNvSpPr>
+          <p:nvPr>
+            <p:ph type="title"/>
+          </p:nvPr>
+        </p:nvSpPr>
+        <p:spPr>
+          <a:xfrm>
+            <a:off x="224328" y="72705"/>
+            <a:ext cx="8596668" cy="682304"/>
+          </a:xfrm>
+        </p:spPr>
+        <p:txBody>
+          <a:bodyPr/>
+          <a:lstStyle/>
+          <a:p>
+            <a:r>
+              <a:rPr lang="en-US" dirty="0"/>
+              <a:t>MODULAR MONOLITHIC ARCHITECTURE</a:t>
+            </a:r>
+            <a:endParaRPr lang="tr-TR" dirty="0"/>
+          </a:p>
+        </p:txBody>
+      </p:sp>
+      <p:sp>
+        <p:nvSpPr>
+          <p:cNvPr id="3" name="Content Placeholder 2">
+            <a:extLst>
+              <a:ext uri="{FF2B5EF4-FFF2-40B4-BE49-F238E27FC236}">
+                <a16:creationId xmlns:a16="http://schemas.microsoft.com/office/drawing/2014/main" id="{E4BAE8E8-A0ED-4128-9076-8134D5A4CD0F}"/>
+              </a:ext>
+            </a:extLst>
+          </p:cNvPr>
+          <p:cNvSpPr>
+            <a:spLocks noGrp="1"/>
+          </p:cNvSpPr>
+          <p:nvPr>
+            <p:ph idx="1"/>
+          </p:nvPr>
+        </p:nvSpPr>
+        <p:spPr>
+          <a:xfrm>
+            <a:off x="400497" y="1107347"/>
+            <a:ext cx="8517000" cy="6102991"/>
+          </a:xfrm>
+        </p:spPr>
+        <p:txBody>
+          <a:bodyPr/>
+          <a:lstStyle/>
+          <a:p>
+            <a:pPr marL="0" indent="0" algn="just">
+              <a:buNone/>
+            </a:pPr>
+            <a:r>
+              <a:rPr lang="en-US" dirty="0">
+                <a:latin typeface="Arial" panose="020B0604020202020204" pitchFamily="34" charset="0"/>
+                <a:cs typeface="Arial" panose="020B0604020202020204" pitchFamily="34" charset="0"/>
+              </a:rPr>
+              <a:t>	</a:t>
+            </a:r>
+            <a:r>
+              <a:rPr lang="tr-TR" dirty="0">
+                <a:latin typeface="Arial" panose="020B0604020202020204" pitchFamily="34" charset="0"/>
+                <a:cs typeface="Arial" panose="020B0604020202020204" pitchFamily="34" charset="0"/>
+              </a:rPr>
+              <a:t>Modüler </a:t>
+            </a:r>
+            <a:r>
+              <a:rPr lang="tr-TR" dirty="0" err="1">
+                <a:latin typeface="Arial" panose="020B0604020202020204" pitchFamily="34" charset="0"/>
+                <a:cs typeface="Arial" panose="020B0604020202020204" pitchFamily="34" charset="0"/>
+              </a:rPr>
+              <a:t>monolit</a:t>
+            </a:r>
+            <a:r>
+              <a:rPr lang="en-US" dirty="0" err="1">
+                <a:latin typeface="Arial" panose="020B0604020202020204" pitchFamily="34" charset="0"/>
+                <a:cs typeface="Arial" panose="020B0604020202020204" pitchFamily="34" charset="0"/>
+              </a:rPr>
+              <a:t>ik</a:t>
+            </a:r>
+            <a:r>
+              <a:rPr lang="en-US" dirty="0">
+                <a:latin typeface="Arial" panose="020B0604020202020204" pitchFamily="34" charset="0"/>
+                <a:cs typeface="Arial" panose="020B0604020202020204" pitchFamily="34" charset="0"/>
+              </a:rPr>
+              <a:t> </a:t>
+            </a:r>
+            <a:r>
+              <a:rPr lang="en-US" dirty="0" err="1">
+                <a:latin typeface="Arial" panose="020B0604020202020204" pitchFamily="34" charset="0"/>
+                <a:cs typeface="Arial" panose="020B0604020202020204" pitchFamily="34" charset="0"/>
+              </a:rPr>
+              <a:t>mimari</a:t>
+            </a:r>
+            <a:r>
+              <a:rPr lang="en-US" dirty="0">
+                <a:latin typeface="Arial" panose="020B0604020202020204" pitchFamily="34" charset="0"/>
+                <a:cs typeface="Arial" panose="020B0604020202020204" pitchFamily="34" charset="0"/>
+              </a:rPr>
+              <a:t>;</a:t>
+            </a:r>
+            <a:r>
+              <a:rPr lang="tr-TR" dirty="0">
+                <a:latin typeface="Arial" panose="020B0604020202020204" pitchFamily="34" charset="0"/>
+                <a:cs typeface="Arial" panose="020B0604020202020204" pitchFamily="34" charset="0"/>
+              </a:rPr>
+              <a:t> </a:t>
+            </a:r>
+            <a:r>
+              <a:rPr lang="en-US" dirty="0" err="1">
+                <a:latin typeface="Arial" panose="020B0604020202020204" pitchFamily="34" charset="0"/>
+                <a:cs typeface="Arial" panose="020B0604020202020204" pitchFamily="34" charset="0"/>
+              </a:rPr>
+              <a:t>yazılım</a:t>
+            </a:r>
+            <a:r>
+              <a:rPr lang="en-US" dirty="0">
+                <a:latin typeface="Arial" panose="020B0604020202020204" pitchFamily="34" charset="0"/>
+                <a:cs typeface="Arial" panose="020B0604020202020204" pitchFamily="34" charset="0"/>
+              </a:rPr>
+              <a:t> </a:t>
+            </a:r>
+            <a:r>
+              <a:rPr lang="en-US" dirty="0" err="1">
+                <a:latin typeface="Arial" panose="020B0604020202020204" pitchFamily="34" charset="0"/>
+                <a:cs typeface="Arial" panose="020B0604020202020204" pitchFamily="34" charset="0"/>
+              </a:rPr>
+              <a:t>projesinin</a:t>
+            </a:r>
+            <a:r>
+              <a:rPr lang="en-US" dirty="0">
+                <a:latin typeface="Arial" panose="020B0604020202020204" pitchFamily="34" charset="0"/>
+                <a:cs typeface="Arial" panose="020B0604020202020204" pitchFamily="34" charset="0"/>
+              </a:rPr>
+              <a:t>, </a:t>
+            </a:r>
+            <a:r>
+              <a:rPr lang="en-US" dirty="0" err="1">
+                <a:latin typeface="Arial" panose="020B0604020202020204" pitchFamily="34" charset="0"/>
+                <a:cs typeface="Arial" panose="020B0604020202020204" pitchFamily="34" charset="0"/>
+              </a:rPr>
+              <a:t>domainlerine</a:t>
+            </a:r>
+            <a:r>
+              <a:rPr lang="en-US" dirty="0">
+                <a:latin typeface="Arial" panose="020B0604020202020204" pitchFamily="34" charset="0"/>
+                <a:cs typeface="Arial" panose="020B0604020202020204" pitchFamily="34" charset="0"/>
+              </a:rPr>
+              <a:t> </a:t>
+            </a:r>
+            <a:r>
+              <a:rPr lang="en-US" dirty="0" err="1">
+                <a:latin typeface="Arial" panose="020B0604020202020204" pitchFamily="34" charset="0"/>
+                <a:cs typeface="Arial" panose="020B0604020202020204" pitchFamily="34" charset="0"/>
+              </a:rPr>
+              <a:t>göre</a:t>
+            </a:r>
+            <a:r>
+              <a:rPr lang="en-US" dirty="0">
+                <a:latin typeface="Arial" panose="020B0604020202020204" pitchFamily="34" charset="0"/>
+                <a:cs typeface="Arial" panose="020B0604020202020204" pitchFamily="34" charset="0"/>
+              </a:rPr>
+              <a:t>,</a:t>
+            </a:r>
+            <a:r>
+              <a:rPr lang="tr-TR" dirty="0">
+                <a:latin typeface="Arial" panose="020B0604020202020204" pitchFamily="34" charset="0"/>
+                <a:cs typeface="Arial" panose="020B0604020202020204" pitchFamily="34" charset="0"/>
+              </a:rPr>
+              <a:t> </a:t>
+            </a:r>
+            <a:r>
+              <a:rPr lang="en-US" dirty="0" err="1">
+                <a:latin typeface="Arial" panose="020B0604020202020204" pitchFamily="34" charset="0"/>
+                <a:cs typeface="Arial" panose="020B0604020202020204" pitchFamily="34" charset="0"/>
+              </a:rPr>
+              <a:t>birbirine</a:t>
+            </a:r>
+            <a:r>
+              <a:rPr lang="en-US" dirty="0">
+                <a:latin typeface="Arial" panose="020B0604020202020204" pitchFamily="34" charset="0"/>
+                <a:cs typeface="Arial" panose="020B0604020202020204" pitchFamily="34" charset="0"/>
+              </a:rPr>
+              <a:t> </a:t>
+            </a:r>
+            <a:r>
+              <a:rPr lang="en-US" dirty="0" err="1">
+                <a:latin typeface="Arial" panose="020B0604020202020204" pitchFamily="34" charset="0"/>
+                <a:cs typeface="Arial" panose="020B0604020202020204" pitchFamily="34" charset="0"/>
+              </a:rPr>
+              <a:t>en</a:t>
+            </a:r>
+            <a:r>
+              <a:rPr lang="en-US" dirty="0">
+                <a:latin typeface="Arial" panose="020B0604020202020204" pitchFamily="34" charset="0"/>
+                <a:cs typeface="Arial" panose="020B0604020202020204" pitchFamily="34" charset="0"/>
+              </a:rPr>
+              <a:t> </a:t>
+            </a:r>
+            <a:r>
+              <a:rPr lang="en-US" dirty="0" err="1">
+                <a:latin typeface="Arial" panose="020B0604020202020204" pitchFamily="34" charset="0"/>
+                <a:cs typeface="Arial" panose="020B0604020202020204" pitchFamily="34" charset="0"/>
+              </a:rPr>
+              <a:t>yakın</a:t>
+            </a:r>
+            <a:r>
+              <a:rPr lang="en-US" dirty="0">
+                <a:latin typeface="Arial" panose="020B0604020202020204" pitchFamily="34" charset="0"/>
+                <a:cs typeface="Arial" panose="020B0604020202020204" pitchFamily="34" charset="0"/>
+              </a:rPr>
+              <a:t> </a:t>
+            </a:r>
+            <a:r>
+              <a:rPr lang="en-US" dirty="0" err="1">
+                <a:latin typeface="Arial" panose="020B0604020202020204" pitchFamily="34" charset="0"/>
+                <a:cs typeface="Arial" panose="020B0604020202020204" pitchFamily="34" charset="0"/>
+              </a:rPr>
+              <a:t>ortak</a:t>
+            </a:r>
+            <a:r>
+              <a:rPr lang="en-US" dirty="0">
+                <a:latin typeface="Arial" panose="020B0604020202020204" pitchFamily="34" charset="0"/>
+                <a:cs typeface="Arial" panose="020B0604020202020204" pitchFamily="34" charset="0"/>
+              </a:rPr>
+              <a:t> </a:t>
+            </a:r>
+            <a:r>
+              <a:rPr lang="tr-TR" dirty="0">
+                <a:latin typeface="Arial" panose="020B0604020202020204" pitchFamily="34" charset="0"/>
+                <a:cs typeface="Arial" panose="020B0604020202020204" pitchFamily="34" charset="0"/>
+              </a:rPr>
+              <a:t>modüllere </a:t>
+            </a:r>
+            <a:r>
+              <a:rPr lang="en-US" dirty="0">
+                <a:latin typeface="Arial" panose="020B0604020202020204" pitchFamily="34" charset="0"/>
+                <a:cs typeface="Arial" panose="020B0604020202020204" pitchFamily="34" charset="0"/>
+              </a:rPr>
+              <a:t>b</a:t>
+            </a:r>
+            <a:r>
+              <a:rPr lang="tr-TR" dirty="0">
+                <a:latin typeface="Arial" panose="020B0604020202020204" pitchFamily="34" charset="0"/>
+                <a:cs typeface="Arial" panose="020B0604020202020204" pitchFamily="34" charset="0"/>
+              </a:rPr>
+              <a:t>öl</a:t>
+            </a:r>
+            <a:r>
+              <a:rPr lang="en-US" dirty="0" err="1">
+                <a:latin typeface="Arial" panose="020B0604020202020204" pitchFamily="34" charset="0"/>
+                <a:cs typeface="Arial" panose="020B0604020202020204" pitchFamily="34" charset="0"/>
+              </a:rPr>
+              <a:t>ünerek</a:t>
+            </a:r>
+            <a:r>
+              <a:rPr lang="en-US" dirty="0">
+                <a:latin typeface="Arial" panose="020B0604020202020204" pitchFamily="34" charset="0"/>
+                <a:cs typeface="Arial" panose="020B0604020202020204" pitchFamily="34" charset="0"/>
+              </a:rPr>
+              <a:t>, </a:t>
+            </a:r>
+            <a:r>
+              <a:rPr lang="en-US" dirty="0" err="1">
+                <a:latin typeface="Arial" panose="020B0604020202020204" pitchFamily="34" charset="0"/>
+                <a:cs typeface="Arial" panose="020B0604020202020204" pitchFamily="34" charset="0"/>
+              </a:rPr>
+              <a:t>tek</a:t>
+            </a:r>
+            <a:r>
+              <a:rPr lang="en-US" dirty="0">
+                <a:latin typeface="Arial" panose="020B0604020202020204" pitchFamily="34" charset="0"/>
+                <a:cs typeface="Arial" panose="020B0604020202020204" pitchFamily="34" charset="0"/>
+              </a:rPr>
+              <a:t> </a:t>
+            </a:r>
+            <a:r>
+              <a:rPr lang="en-US" dirty="0" err="1">
+                <a:latin typeface="Arial" panose="020B0604020202020204" pitchFamily="34" charset="0"/>
+                <a:cs typeface="Arial" panose="020B0604020202020204" pitchFamily="34" charset="0"/>
+              </a:rPr>
+              <a:t>bir</a:t>
+            </a:r>
+            <a:r>
+              <a:rPr lang="en-US" dirty="0">
+                <a:latin typeface="Arial" panose="020B0604020202020204" pitchFamily="34" charset="0"/>
+                <a:cs typeface="Arial" panose="020B0604020202020204" pitchFamily="34" charset="0"/>
+              </a:rPr>
+              <a:t> </a:t>
+            </a:r>
+            <a:r>
+              <a:rPr lang="en-US" dirty="0" err="1">
+                <a:latin typeface="Arial" panose="020B0604020202020204" pitchFamily="34" charset="0"/>
+                <a:cs typeface="Arial" panose="020B0604020202020204" pitchFamily="34" charset="0"/>
+              </a:rPr>
+              <a:t>veritabanı</a:t>
+            </a:r>
+            <a:r>
+              <a:rPr lang="en-US" dirty="0">
+                <a:latin typeface="Arial" panose="020B0604020202020204" pitchFamily="34" charset="0"/>
+                <a:cs typeface="Arial" panose="020B0604020202020204" pitchFamily="34" charset="0"/>
+              </a:rPr>
+              <a:t> </a:t>
+            </a:r>
+            <a:r>
+              <a:rPr lang="en-US" dirty="0" err="1">
+                <a:latin typeface="Arial" panose="020B0604020202020204" pitchFamily="34" charset="0"/>
+                <a:cs typeface="Arial" panose="020B0604020202020204" pitchFamily="34" charset="0"/>
+              </a:rPr>
+              <a:t>kullanılarak</a:t>
+            </a:r>
+            <a:r>
+              <a:rPr lang="en-US" dirty="0">
+                <a:latin typeface="Arial" panose="020B0604020202020204" pitchFamily="34" charset="0"/>
+                <a:cs typeface="Arial" panose="020B0604020202020204" pitchFamily="34" charset="0"/>
+              </a:rPr>
+              <a:t> </a:t>
+            </a:r>
+            <a:r>
+              <a:rPr lang="en-US" dirty="0" err="1">
+                <a:latin typeface="Arial" panose="020B0604020202020204" pitchFamily="34" charset="0"/>
+                <a:cs typeface="Arial" panose="020B0604020202020204" pitchFamily="34" charset="0"/>
+              </a:rPr>
+              <a:t>tasarlanmış</a:t>
+            </a:r>
+            <a:r>
+              <a:rPr lang="en-US" dirty="0">
+                <a:latin typeface="Arial" panose="020B0604020202020204" pitchFamily="34" charset="0"/>
+                <a:cs typeface="Arial" panose="020B0604020202020204" pitchFamily="34" charset="0"/>
+              </a:rPr>
+              <a:t> </a:t>
+            </a:r>
+            <a:r>
+              <a:rPr lang="en-US" dirty="0" err="1">
+                <a:latin typeface="Arial" panose="020B0604020202020204" pitchFamily="34" charset="0"/>
+                <a:cs typeface="Arial" panose="020B0604020202020204" pitchFamily="34" charset="0"/>
+              </a:rPr>
+              <a:t>yazılım</a:t>
+            </a:r>
+            <a:r>
+              <a:rPr lang="en-US" dirty="0">
+                <a:latin typeface="Arial" panose="020B0604020202020204" pitchFamily="34" charset="0"/>
+                <a:cs typeface="Arial" panose="020B0604020202020204" pitchFamily="34" charset="0"/>
+              </a:rPr>
+              <a:t> </a:t>
+            </a:r>
+            <a:r>
+              <a:rPr lang="en-US" dirty="0" err="1">
+                <a:latin typeface="Arial" panose="020B0604020202020204" pitchFamily="34" charset="0"/>
+                <a:cs typeface="Arial" panose="020B0604020202020204" pitchFamily="34" charset="0"/>
+              </a:rPr>
+              <a:t>mimarisidir</a:t>
+            </a:r>
+            <a:r>
+              <a:rPr lang="tr-TR" dirty="0">
+                <a:latin typeface="Arial" panose="020B0604020202020204" pitchFamily="34" charset="0"/>
+                <a:cs typeface="Arial" panose="020B0604020202020204" pitchFamily="34" charset="0"/>
+              </a:rPr>
+              <a:t>. Modüler </a:t>
+            </a:r>
+            <a:r>
+              <a:rPr lang="tr-TR" dirty="0" err="1">
+                <a:latin typeface="Arial" panose="020B0604020202020204" pitchFamily="34" charset="0"/>
+                <a:cs typeface="Arial" panose="020B0604020202020204" pitchFamily="34" charset="0"/>
+              </a:rPr>
+              <a:t>monolit</a:t>
+            </a:r>
+            <a:r>
+              <a:rPr lang="en-US" dirty="0">
+                <a:latin typeface="Arial" panose="020B0604020202020204" pitchFamily="34" charset="0"/>
+                <a:cs typeface="Arial" panose="020B0604020202020204" pitchFamily="34" charset="0"/>
+              </a:rPr>
+              <a:t> </a:t>
+            </a:r>
+            <a:r>
+              <a:rPr lang="tr-TR" dirty="0">
+                <a:latin typeface="Arial" panose="020B0604020202020204" pitchFamily="34" charset="0"/>
+                <a:cs typeface="Arial" panose="020B0604020202020204" pitchFamily="34" charset="0"/>
+              </a:rPr>
+              <a:t>in yaygın alternatif adı "makro </a:t>
+            </a:r>
+            <a:r>
+              <a:rPr lang="tr-TR" dirty="0" err="1">
+                <a:latin typeface="Arial" panose="020B0604020202020204" pitchFamily="34" charset="0"/>
+                <a:cs typeface="Arial" panose="020B0604020202020204" pitchFamily="34" charset="0"/>
+              </a:rPr>
+              <a:t>hizmet"tir</a:t>
+            </a:r>
+            <a:r>
+              <a:rPr lang="tr-TR" dirty="0">
+                <a:latin typeface="Arial" panose="020B0604020202020204" pitchFamily="34" charset="0"/>
+                <a:cs typeface="Arial" panose="020B0604020202020204" pitchFamily="34" charset="0"/>
+              </a:rPr>
+              <a:t>. Makro hizmetler sistemi yeteneklere ayırır (bir yetenek birden fazla iş etki alanından oluşur).</a:t>
+            </a:r>
+          </a:p>
+          <a:p>
+            <a:pPr marL="0" indent="0" algn="just">
+              <a:buNone/>
+            </a:pPr>
+            <a:r>
+              <a:rPr lang="tr-TR" dirty="0">
+                <a:latin typeface="Arial" panose="020B0604020202020204" pitchFamily="34" charset="0"/>
+                <a:cs typeface="Arial" panose="020B0604020202020204" pitchFamily="34" charset="0"/>
+              </a:rPr>
+              <a:t>Modüler </a:t>
+            </a:r>
+            <a:r>
+              <a:rPr lang="tr-TR" dirty="0" err="1">
+                <a:latin typeface="Arial" panose="020B0604020202020204" pitchFamily="34" charset="0"/>
+                <a:cs typeface="Arial" panose="020B0604020202020204" pitchFamily="34" charset="0"/>
+              </a:rPr>
+              <a:t>monolit</a:t>
+            </a:r>
+            <a:r>
+              <a:rPr lang="tr-TR" dirty="0">
+                <a:latin typeface="Arial" panose="020B0604020202020204" pitchFamily="34" charset="0"/>
+                <a:cs typeface="Arial" panose="020B0604020202020204" pitchFamily="34" charset="0"/>
+              </a:rPr>
+              <a:t>/makro hizmetlerin üst düzey teknik özellikleri:</a:t>
+            </a:r>
+          </a:p>
+          <a:p>
+            <a:pPr algn="just"/>
+            <a:r>
+              <a:rPr lang="tr-TR" dirty="0">
+                <a:latin typeface="Arial" panose="020B0604020202020204" pitchFamily="34" charset="0"/>
+                <a:cs typeface="Arial" panose="020B0604020202020204" pitchFamily="34" charset="0"/>
+              </a:rPr>
+              <a:t>Modüler </a:t>
+            </a:r>
+            <a:r>
+              <a:rPr lang="tr-TR" dirty="0" err="1">
+                <a:latin typeface="Arial" panose="020B0604020202020204" pitchFamily="34" charset="0"/>
+                <a:cs typeface="Arial" panose="020B0604020202020204" pitchFamily="34" charset="0"/>
+              </a:rPr>
+              <a:t>monolit</a:t>
+            </a:r>
+            <a:r>
+              <a:rPr lang="en-US">
+                <a:latin typeface="Arial" panose="020B0604020202020204" pitchFamily="34" charset="0"/>
+                <a:cs typeface="Arial" panose="020B0604020202020204" pitchFamily="34" charset="0"/>
+              </a:rPr>
+              <a:t> </a:t>
+            </a:r>
+            <a:r>
+              <a:rPr lang="tr-TR">
+                <a:latin typeface="Arial" panose="020B0604020202020204" pitchFamily="34" charset="0"/>
+                <a:cs typeface="Arial" panose="020B0604020202020204" pitchFamily="34" charset="0"/>
+              </a:rPr>
+              <a:t>te</a:t>
+            </a:r>
+            <a:r>
+              <a:rPr lang="tr-TR" dirty="0">
+                <a:latin typeface="Arial" panose="020B0604020202020204" pitchFamily="34" charset="0"/>
+                <a:cs typeface="Arial" panose="020B0604020202020204" pitchFamily="34" charset="0"/>
+              </a:rPr>
+              <a:t>, mikro hizmetler gibi, her modül başka bir modülle </a:t>
+            </a:r>
+            <a:r>
+              <a:rPr lang="tr-TR" dirty="0" err="1">
+                <a:latin typeface="Arial" panose="020B0604020202020204" pitchFamily="34" charset="0"/>
+                <a:cs typeface="Arial" panose="020B0604020202020204" pitchFamily="34" charset="0"/>
+              </a:rPr>
+              <a:t>API'ler</a:t>
+            </a:r>
+            <a:r>
+              <a:rPr lang="tr-TR" dirty="0">
+                <a:latin typeface="Arial" panose="020B0604020202020204" pitchFamily="34" charset="0"/>
+                <a:cs typeface="Arial" panose="020B0604020202020204" pitchFamily="34" charset="0"/>
+              </a:rPr>
+              <a:t> aracılığıyla, tercihen gevşek bağlı asenkron iletişim yoluyla iletişim kurar.</a:t>
+            </a:r>
+          </a:p>
+          <a:p>
+            <a:pPr algn="just"/>
+            <a:r>
+              <a:rPr lang="tr-TR" dirty="0">
+                <a:latin typeface="Arial" panose="020B0604020202020204" pitchFamily="34" charset="0"/>
+                <a:cs typeface="Arial" panose="020B0604020202020204" pitchFamily="34" charset="0"/>
+              </a:rPr>
+              <a:t>Tıpkı </a:t>
+            </a:r>
+            <a:r>
+              <a:rPr lang="tr-TR" dirty="0" err="1">
+                <a:latin typeface="Arial" panose="020B0604020202020204" pitchFamily="34" charset="0"/>
+                <a:cs typeface="Arial" panose="020B0604020202020204" pitchFamily="34" charset="0"/>
+              </a:rPr>
+              <a:t>monolit</a:t>
+            </a:r>
+            <a:r>
+              <a:rPr lang="tr-TR" dirty="0">
+                <a:latin typeface="Arial" panose="020B0604020202020204" pitchFamily="34" charset="0"/>
+                <a:cs typeface="Arial" panose="020B0604020202020204" pitchFamily="34" charset="0"/>
+              </a:rPr>
+              <a:t> gibi modüler bir </a:t>
+            </a:r>
+            <a:r>
+              <a:rPr lang="tr-TR" dirty="0" err="1">
+                <a:latin typeface="Arial" panose="020B0604020202020204" pitchFamily="34" charset="0"/>
+                <a:cs typeface="Arial" panose="020B0604020202020204" pitchFamily="34" charset="0"/>
+              </a:rPr>
+              <a:t>monolitte</a:t>
+            </a:r>
+            <a:r>
+              <a:rPr lang="tr-TR" dirty="0">
+                <a:latin typeface="Arial" panose="020B0604020202020204" pitchFamily="34" charset="0"/>
+                <a:cs typeface="Arial" panose="020B0604020202020204" pitchFamily="34" charset="0"/>
+              </a:rPr>
+              <a:t>, her mikro hizmetin kendi şemasına sahip olması gereken mikro hizmetlerin aksine, sistem tek bir </a:t>
+            </a:r>
+            <a:r>
+              <a:rPr lang="tr-TR" dirty="0" err="1">
+                <a:latin typeface="Arial" panose="020B0604020202020204" pitchFamily="34" charset="0"/>
+                <a:cs typeface="Arial" panose="020B0604020202020204" pitchFamily="34" charset="0"/>
+              </a:rPr>
+              <a:t>veritabanı</a:t>
+            </a:r>
+            <a:r>
+              <a:rPr lang="tr-TR" dirty="0">
+                <a:latin typeface="Arial" panose="020B0604020202020204" pitchFamily="34" charset="0"/>
+                <a:cs typeface="Arial" panose="020B0604020202020204" pitchFamily="34" charset="0"/>
+              </a:rPr>
+              <a:t> şemasına sahiptir.</a:t>
+            </a:r>
+          </a:p>
+          <a:p>
+            <a:pPr algn="just"/>
+            <a:r>
+              <a:rPr lang="tr-TR" dirty="0">
+                <a:latin typeface="Arial" panose="020B0604020202020204" pitchFamily="34" charset="0"/>
+                <a:cs typeface="Arial" panose="020B0604020202020204" pitchFamily="34" charset="0"/>
+              </a:rPr>
+              <a:t>Genellikle modüler bir </a:t>
+            </a:r>
+            <a:r>
+              <a:rPr lang="tr-TR" dirty="0" err="1">
+                <a:latin typeface="Arial" panose="020B0604020202020204" pitchFamily="34" charset="0"/>
+                <a:cs typeface="Arial" panose="020B0604020202020204" pitchFamily="34" charset="0"/>
+              </a:rPr>
+              <a:t>monolitteki</a:t>
+            </a:r>
+            <a:r>
+              <a:rPr lang="tr-TR" dirty="0">
+                <a:latin typeface="Arial" panose="020B0604020202020204" pitchFamily="34" charset="0"/>
+                <a:cs typeface="Arial" panose="020B0604020202020204" pitchFamily="34" charset="0"/>
+              </a:rPr>
+              <a:t> tüm modüller aynı VM üzerinde çalışır. veya her modül belirli bir özel VM üzerinde çalışır. </a:t>
+            </a:r>
+            <a:r>
+              <a:rPr lang="en-US" dirty="0" err="1">
+                <a:latin typeface="Arial" panose="020B0604020202020204" pitchFamily="34" charset="0"/>
+                <a:cs typeface="Arial" panose="020B0604020202020204" pitchFamily="34" charset="0"/>
+              </a:rPr>
+              <a:t>Tüm</a:t>
+            </a:r>
+            <a:r>
+              <a:rPr lang="en-US" dirty="0">
+                <a:latin typeface="Arial" panose="020B0604020202020204" pitchFamily="34" charset="0"/>
+                <a:cs typeface="Arial" panose="020B0604020202020204" pitchFamily="34" charset="0"/>
+              </a:rPr>
+              <a:t> m</a:t>
+            </a:r>
+            <a:r>
+              <a:rPr lang="tr-TR" dirty="0" err="1">
+                <a:latin typeface="Arial" panose="020B0604020202020204" pitchFamily="34" charset="0"/>
+                <a:cs typeface="Arial" panose="020B0604020202020204" pitchFamily="34" charset="0"/>
+              </a:rPr>
+              <a:t>odüller</a:t>
+            </a:r>
+            <a:r>
+              <a:rPr lang="en-US" dirty="0">
+                <a:latin typeface="Arial" panose="020B0604020202020204" pitchFamily="34" charset="0"/>
+                <a:cs typeface="Arial" panose="020B0604020202020204" pitchFamily="34" charset="0"/>
+              </a:rPr>
+              <a:t>in </a:t>
+            </a:r>
+            <a:r>
+              <a:rPr lang="en-US" dirty="0" err="1">
+                <a:latin typeface="Arial" panose="020B0604020202020204" pitchFamily="34" charset="0"/>
+                <a:cs typeface="Arial" panose="020B0604020202020204" pitchFamily="34" charset="0"/>
+              </a:rPr>
+              <a:t>hepsi</a:t>
+            </a:r>
+            <a:r>
+              <a:rPr lang="tr-TR" dirty="0">
+                <a:latin typeface="Arial" panose="020B0604020202020204" pitchFamily="34" charset="0"/>
+                <a:cs typeface="Arial" panose="020B0604020202020204" pitchFamily="34" charset="0"/>
+              </a:rPr>
+              <a:t> bir </a:t>
+            </a:r>
+            <a:r>
+              <a:rPr lang="en-US" dirty="0">
+                <a:latin typeface="Arial" panose="020B0604020202020204" pitchFamily="34" charset="0"/>
+                <a:cs typeface="Arial" panose="020B0604020202020204" pitchFamily="34" charset="0"/>
+              </a:rPr>
+              <a:t>container a </a:t>
+            </a:r>
+            <a:r>
+              <a:rPr lang="tr-TR" dirty="0">
+                <a:latin typeface="Arial" panose="020B0604020202020204" pitchFamily="34" charset="0"/>
+                <a:cs typeface="Arial" panose="020B0604020202020204" pitchFamily="34" charset="0"/>
+              </a:rPr>
+              <a:t>sığmayacak kadar büyüktür.</a:t>
+            </a:r>
+          </a:p>
+          <a:p>
+            <a:endParaRPr lang="tr-TR" dirty="0"/>
+          </a:p>
+        </p:txBody>
+      </p:sp>
+    </p:spTree>
+    <p:extLst>
+      <p:ext uri="{BB962C8B-B14F-4D97-AF65-F5344CB8AC3E}">
+        <p14:creationId xmlns:p14="http://schemas.microsoft.com/office/powerpoint/2010/main" val="3182224268"/>
+      </p:ext>
+    </p:extLst>
+  </p:cSld>
+  <p:clrMapOvr>
+    <a:masterClrMapping/>
+  </p:clrMapOvr>
+</p:sld>
+</file>
+
+<file path=ppt/slides/slide17.xml><?xml version="1.0" encoding="utf-8"?>
+<p:sld xmlns:a="http://schemas.openxmlformats.org/drawingml/2006/main" xmlns:r="http://schemas.openxmlformats.org/officeDocument/2006/relationships" xmlns:p="http://schemas.openxmlformats.org/presentationml/2006/main">
+  <p:cSld>
+    <p:spTree>
+      <p:nvGrpSpPr>
+        <p:cNvPr id="1" name=""/>
+        <p:cNvGrpSpPr/>
+        <p:nvPr/>
+      </p:nvGrpSpPr>
+      <p:grpSpPr>
+        <a:xfrm>
+          <a:off x="0" y="0"/>
+          <a:ext cx="0" cy="0"/>
+          <a:chOff x="0" y="0"/>
+          <a:chExt cx="0" cy="0"/>
+        </a:xfrm>
+      </p:grpSpPr>
+      <p:pic>
+        <p:nvPicPr>
+          <p:cNvPr id="4" name="Picture 3">
+            <a:extLst>
+              <a:ext uri="{FF2B5EF4-FFF2-40B4-BE49-F238E27FC236}">
+                <a16:creationId xmlns:a16="http://schemas.microsoft.com/office/drawing/2014/main" id="{F197D5D3-61CC-4D4F-A899-595A45882D0A}"/>
+              </a:ext>
+            </a:extLst>
+          </p:cNvPr>
+          <p:cNvPicPr>
+            <a:picLocks noChangeAspect="1"/>
+          </p:cNvPicPr>
+          <p:nvPr/>
+        </p:nvPicPr>
+        <p:blipFill>
+          <a:blip r:embed="rId2"/>
+          <a:stretch>
+            <a:fillRect/>
+          </a:stretch>
+        </p:blipFill>
+        <p:spPr>
+          <a:xfrm>
+            <a:off x="891506" y="805343"/>
+            <a:ext cx="8496300" cy="4391025"/>
+          </a:xfrm>
+          <a:prstGeom prst="rect">
+            <a:avLst/>
+          </a:prstGeom>
+        </p:spPr>
+      </p:pic>
+      <p:sp>
+        <p:nvSpPr>
+          <p:cNvPr id="6" name="Title 1">
+            <a:extLst>
+              <a:ext uri="{FF2B5EF4-FFF2-40B4-BE49-F238E27FC236}">
+                <a16:creationId xmlns:a16="http://schemas.microsoft.com/office/drawing/2014/main" id="{517D5375-53A9-4C94-9F28-07303ADEBEF5}"/>
+              </a:ext>
+            </a:extLst>
+          </p:cNvPr>
+          <p:cNvSpPr txBox="1">
+            <a:spLocks/>
+          </p:cNvSpPr>
+          <p:nvPr/>
+        </p:nvSpPr>
+        <p:spPr>
+          <a:xfrm>
+            <a:off x="364034" y="6378602"/>
+            <a:ext cx="4895863" cy="479398"/>
+          </a:xfrm>
+          <a:prstGeom prst="rect">
+            <a:avLst/>
+          </a:prstGeom>
+        </p:spPr>
+        <p:txBody>
+          <a:bodyPr vert="horz" lIns="91440" tIns="45720" rIns="91440" bIns="45720" rtlCol="0" anchor="t">
+            <a:normAutofit fontScale="55000" lnSpcReduction="20000"/>
+          </a:bodyPr>
+          <a:lstStyle>
+            <a:lvl1pPr algn="l" defTabSz="457200" rtl="0" eaLnBrk="1" latinLnBrk="0" hangingPunct="1">
+              <a:spcBef>
+                <a:spcPct val="0"/>
+              </a:spcBef>
+              <a:buNone/>
+              <a:defRPr sz="3600" kern="1200">
+                <a:solidFill>
+                  <a:schemeClr val="accent1"/>
+                </a:solidFill>
+                <a:latin typeface="+mj-lt"/>
+                <a:ea typeface="+mj-ea"/>
+                <a:cs typeface="+mj-cs"/>
+              </a:defRPr>
+            </a:lvl1pPr>
+            <a:lvl2pPr eaLnBrk="1" hangingPunct="1">
+              <a:defRPr>
+                <a:solidFill>
+                  <a:schemeClr val="tx2"/>
+                </a:solidFill>
+              </a:defRPr>
+            </a:lvl2pPr>
+            <a:lvl3pPr eaLnBrk="1" hangingPunct="1">
+              <a:defRPr>
+                <a:solidFill>
+                  <a:schemeClr val="tx2"/>
+                </a:solidFill>
+              </a:defRPr>
+            </a:lvl3pPr>
+            <a:lvl4pPr eaLnBrk="1" hangingPunct="1">
+              <a:defRPr>
+                <a:solidFill>
+                  <a:schemeClr val="tx2"/>
+                </a:solidFill>
+              </a:defRPr>
+            </a:lvl4pPr>
+            <a:lvl5pPr eaLnBrk="1" hangingPunct="1">
+              <a:defRPr>
+                <a:solidFill>
+                  <a:schemeClr val="tx2"/>
+                </a:solidFill>
+              </a:defRPr>
+            </a:lvl5pPr>
+            <a:lvl6pPr eaLnBrk="1" hangingPunct="1">
+              <a:defRPr>
+                <a:solidFill>
+                  <a:schemeClr val="tx2"/>
+                </a:solidFill>
+              </a:defRPr>
+            </a:lvl6pPr>
+            <a:lvl7pPr eaLnBrk="1" hangingPunct="1">
+              <a:defRPr>
+                <a:solidFill>
+                  <a:schemeClr val="tx2"/>
+                </a:solidFill>
+              </a:defRPr>
+            </a:lvl7pPr>
+            <a:lvl8pPr eaLnBrk="1" hangingPunct="1">
+              <a:defRPr>
+                <a:solidFill>
+                  <a:schemeClr val="tx2"/>
+                </a:solidFill>
+              </a:defRPr>
+            </a:lvl8pPr>
+            <a:lvl9pPr eaLnBrk="1" hangingPunct="1">
+              <a:defRPr>
+                <a:solidFill>
+                  <a:schemeClr val="tx2"/>
+                </a:solidFill>
+              </a:defRPr>
+            </a:lvl9pPr>
+          </a:lstStyle>
+          <a:p>
+            <a:r>
+              <a:rPr lang="en-US" dirty="0"/>
+              <a:t>MODULER MONOLITHIC ARCHITECTURE</a:t>
+            </a:r>
+            <a:endParaRPr lang="tr-TR" dirty="0"/>
+          </a:p>
+        </p:txBody>
+      </p:sp>
+    </p:spTree>
+    <p:extLst>
+      <p:ext uri="{BB962C8B-B14F-4D97-AF65-F5344CB8AC3E}">
+        <p14:creationId xmlns:p14="http://schemas.microsoft.com/office/powerpoint/2010/main" val="3679040286"/>
+      </p:ext>
+    </p:extLst>
+  </p:cSld>
+  <p:clrMapOvr>
+    <a:masterClrMapping/>
+  </p:clrMapOvr>
+</p:sld>
+</file>
+
+<file path=ppt/slides/slide18.xml><?xml version="1.0" encoding="utf-8"?>
+<p:sld xmlns:a="http://schemas.openxmlformats.org/drawingml/2006/main" xmlns:r="http://schemas.openxmlformats.org/officeDocument/2006/relationships" xmlns:p="http://schemas.openxmlformats.org/presentationml/2006/main">
+  <p:cSld>
+    <p:spTree>
+      <p:nvGrpSpPr>
+        <p:cNvPr id="1" name=""/>
+        <p:cNvGrpSpPr/>
+        <p:nvPr/>
+      </p:nvGrpSpPr>
+      <p:grpSpPr>
+        <a:xfrm>
+          <a:off x="0" y="0"/>
+          <a:ext cx="0" cy="0"/>
+          <a:chOff x="0" y="0"/>
+          <a:chExt cx="0" cy="0"/>
+        </a:xfrm>
+      </p:grpSpPr>
+      <p:pic>
+        <p:nvPicPr>
+          <p:cNvPr id="4" name="Picture 3">
+            <a:extLst>
+              <a:ext uri="{FF2B5EF4-FFF2-40B4-BE49-F238E27FC236}">
+                <a16:creationId xmlns:a16="http://schemas.microsoft.com/office/drawing/2014/main" id="{7283CE44-A1D1-4FEB-920F-2A155EF2364F}"/>
+              </a:ext>
+            </a:extLst>
+          </p:cNvPr>
+          <p:cNvPicPr>
+            <a:picLocks noChangeAspect="1"/>
+          </p:cNvPicPr>
+          <p:nvPr/>
+        </p:nvPicPr>
+        <p:blipFill>
+          <a:blip r:embed="rId2"/>
+          <a:stretch>
+            <a:fillRect/>
+          </a:stretch>
+        </p:blipFill>
+        <p:spPr>
+          <a:xfrm>
+            <a:off x="1374658" y="214750"/>
+            <a:ext cx="6359992" cy="6206848"/>
+          </a:xfrm>
+          <a:prstGeom prst="rect">
+            <a:avLst/>
+          </a:prstGeom>
+        </p:spPr>
+      </p:pic>
+      <p:sp>
+        <p:nvSpPr>
+          <p:cNvPr id="5" name="Title 1">
+            <a:extLst>
+              <a:ext uri="{FF2B5EF4-FFF2-40B4-BE49-F238E27FC236}">
+                <a16:creationId xmlns:a16="http://schemas.microsoft.com/office/drawing/2014/main" id="{007B0CA4-C1A2-479C-9A7B-0767D7209EC3}"/>
+              </a:ext>
+            </a:extLst>
+          </p:cNvPr>
+          <p:cNvSpPr txBox="1">
+            <a:spLocks/>
+          </p:cNvSpPr>
+          <p:nvPr/>
+        </p:nvSpPr>
+        <p:spPr>
+          <a:xfrm>
+            <a:off x="364034" y="6378602"/>
+            <a:ext cx="4895863" cy="479398"/>
+          </a:xfrm>
+          <a:prstGeom prst="rect">
+            <a:avLst/>
+          </a:prstGeom>
+        </p:spPr>
+        <p:txBody>
+          <a:bodyPr vert="horz" lIns="91440" tIns="45720" rIns="91440" bIns="45720" rtlCol="0" anchor="t">
+            <a:normAutofit fontScale="55000" lnSpcReduction="20000"/>
+          </a:bodyPr>
+          <a:lstStyle>
+            <a:lvl1pPr algn="l" defTabSz="457200" rtl="0" eaLnBrk="1" latinLnBrk="0" hangingPunct="1">
+              <a:spcBef>
+                <a:spcPct val="0"/>
+              </a:spcBef>
+              <a:buNone/>
+              <a:defRPr sz="3600" kern="1200">
+                <a:solidFill>
+                  <a:schemeClr val="accent1"/>
+                </a:solidFill>
+                <a:latin typeface="+mj-lt"/>
+                <a:ea typeface="+mj-ea"/>
+                <a:cs typeface="+mj-cs"/>
+              </a:defRPr>
+            </a:lvl1pPr>
+            <a:lvl2pPr eaLnBrk="1" hangingPunct="1">
+              <a:defRPr>
+                <a:solidFill>
+                  <a:schemeClr val="tx2"/>
+                </a:solidFill>
+              </a:defRPr>
+            </a:lvl2pPr>
+            <a:lvl3pPr eaLnBrk="1" hangingPunct="1">
+              <a:defRPr>
+                <a:solidFill>
+                  <a:schemeClr val="tx2"/>
+                </a:solidFill>
+              </a:defRPr>
+            </a:lvl3pPr>
+            <a:lvl4pPr eaLnBrk="1" hangingPunct="1">
+              <a:defRPr>
+                <a:solidFill>
+                  <a:schemeClr val="tx2"/>
+                </a:solidFill>
+              </a:defRPr>
+            </a:lvl4pPr>
+            <a:lvl5pPr eaLnBrk="1" hangingPunct="1">
+              <a:defRPr>
+                <a:solidFill>
+                  <a:schemeClr val="tx2"/>
+                </a:solidFill>
+              </a:defRPr>
+            </a:lvl5pPr>
+            <a:lvl6pPr eaLnBrk="1" hangingPunct="1">
+              <a:defRPr>
+                <a:solidFill>
+                  <a:schemeClr val="tx2"/>
+                </a:solidFill>
+              </a:defRPr>
+            </a:lvl6pPr>
+            <a:lvl7pPr eaLnBrk="1" hangingPunct="1">
+              <a:defRPr>
+                <a:solidFill>
+                  <a:schemeClr val="tx2"/>
+                </a:solidFill>
+              </a:defRPr>
+            </a:lvl7pPr>
+            <a:lvl8pPr eaLnBrk="1" hangingPunct="1">
+              <a:defRPr>
+                <a:solidFill>
+                  <a:schemeClr val="tx2"/>
+                </a:solidFill>
+              </a:defRPr>
+            </a:lvl8pPr>
+            <a:lvl9pPr eaLnBrk="1" hangingPunct="1">
+              <a:defRPr>
+                <a:solidFill>
+                  <a:schemeClr val="tx2"/>
+                </a:solidFill>
+              </a:defRPr>
+            </a:lvl9pPr>
+          </a:lstStyle>
+          <a:p>
+            <a:r>
+              <a:rPr lang="en-US" dirty="0"/>
+              <a:t>MODULER MONOLITHIC ARCHITECTURE</a:t>
+            </a:r>
+            <a:endParaRPr lang="tr-TR" dirty="0"/>
+          </a:p>
+        </p:txBody>
+      </p:sp>
+    </p:spTree>
+    <p:extLst>
+      <p:ext uri="{BB962C8B-B14F-4D97-AF65-F5344CB8AC3E}">
+        <p14:creationId xmlns:p14="http://schemas.microsoft.com/office/powerpoint/2010/main" val="2929514821"/>
+      </p:ext>
+    </p:extLst>
+  </p:cSld>
+  <p:clrMapOvr>
+    <a:masterClrMapping/>
+  </p:clrMapOvr>
+</p:sld>
+</file>
+
+<file path=ppt/slides/slide19.xml><?xml version="1.0" encoding="utf-8"?>
+<p:sld xmlns:a="http://schemas.openxmlformats.org/drawingml/2006/main" xmlns:r="http://schemas.openxmlformats.org/officeDocument/2006/relationships" xmlns:p="http://schemas.openxmlformats.org/presentationml/2006/main">
+  <p:cSld>
+    <p:spTree>
+      <p:nvGrpSpPr>
+        <p:cNvPr id="1" name=""/>
+        <p:cNvGrpSpPr/>
+        <p:nvPr/>
+      </p:nvGrpSpPr>
+      <p:grpSpPr>
+        <a:xfrm>
+          <a:off x="0" y="0"/>
+          <a:ext cx="0" cy="0"/>
+          <a:chOff x="0" y="0"/>
+          <a:chExt cx="0" cy="0"/>
+        </a:xfrm>
+      </p:grpSpPr>
+      <p:sp>
+        <p:nvSpPr>
           <p:cNvPr id="3" name="Content Placeholder 2">
             <a:extLst>
               <a:ext uri="{FF2B5EF4-FFF2-40B4-BE49-F238E27FC236}">
@@ -10832,16 +11823,12 @@
               <a:buNone/>
             </a:pPr>
             <a:r>
-              <a:rPr lang="en-US" b="1">
+              <a:rPr lang="en-US" b="1" dirty="0">
                 <a:latin typeface="Arial" panose="020B0604020202020204" pitchFamily="34" charset="0"/>
                 <a:cs typeface="Arial" panose="020B0604020202020204" pitchFamily="34" charset="0"/>
               </a:rPr>
               <a:t>KAYNAKLAR:</a:t>
             </a:r>
-            <a:endParaRPr lang="en-US" b="1" dirty="0">
-              <a:latin typeface="Arial" panose="020B0604020202020204" pitchFamily="34" charset="0"/>
-              <a:cs typeface="Arial" panose="020B0604020202020204" pitchFamily="34" charset="0"/>
-            </a:endParaRPr>
           </a:p>
           <a:p>
             <a:pPr>
@@ -10910,6 +11897,52 @@
               </a:rPr>
               <a:t>https://www.orientsoftware.com/blog/soa-vs-microservices/</a:t>
             </a:r>
+            <a:endParaRPr lang="en-US" dirty="0">
+              <a:latin typeface="Arial" panose="020B0604020202020204" pitchFamily="34" charset="0"/>
+              <a:cs typeface="Arial" panose="020B0604020202020204" pitchFamily="34" charset="0"/>
+            </a:endParaRPr>
+          </a:p>
+          <a:p>
+            <a:pPr>
+              <a:buFont typeface="Wingdings" panose="05000000000000000000" pitchFamily="2" charset="2"/>
+              <a:buChar char="§"/>
+            </a:pPr>
+            <a:r>
+              <a:rPr lang="en-US" dirty="0">
+                <a:latin typeface="Arial" panose="020B0604020202020204" pitchFamily="34" charset="0"/>
+                <a:cs typeface="Arial" panose="020B0604020202020204" pitchFamily="34" charset="0"/>
+                <a:hlinkClick r:id="rId6"/>
+              </a:rPr>
+              <a:t>https://www.fullstacklabs.co/blog/modular-monolithic-vs-microservices</a:t>
+            </a:r>
+            <a:endParaRPr lang="en-US" dirty="0">
+              <a:latin typeface="Arial" panose="020B0604020202020204" pitchFamily="34" charset="0"/>
+              <a:cs typeface="Arial" panose="020B0604020202020204" pitchFamily="34" charset="0"/>
+            </a:endParaRPr>
+          </a:p>
+          <a:p>
+            <a:pPr>
+              <a:buFont typeface="Wingdings" panose="05000000000000000000" pitchFamily="2" charset="2"/>
+              <a:buChar char="§"/>
+            </a:pPr>
+            <a:r>
+              <a:rPr lang="en-US" dirty="0">
+                <a:latin typeface="Arial" panose="020B0604020202020204" pitchFamily="34" charset="0"/>
+                <a:cs typeface="Arial" panose="020B0604020202020204" pitchFamily="34" charset="0"/>
+                <a:hlinkClick r:id="rId7"/>
+              </a:rPr>
+              <a:t>https://medium.com/att-israel/will-modular-monolith-replace-microservices-architecture-a8356674e2ea</a:t>
+            </a:r>
+            <a:endParaRPr lang="en-US" dirty="0">
+              <a:latin typeface="Arial" panose="020B0604020202020204" pitchFamily="34" charset="0"/>
+              <a:cs typeface="Arial" panose="020B0604020202020204" pitchFamily="34" charset="0"/>
+            </a:endParaRPr>
+          </a:p>
+          <a:p>
+            <a:pPr>
+              <a:buFont typeface="Wingdings" panose="05000000000000000000" pitchFamily="2" charset="2"/>
+              <a:buChar char="§"/>
+            </a:pPr>
             <a:endParaRPr lang="en-US" dirty="0">
               <a:latin typeface="Arial" panose="020B0604020202020204" pitchFamily="34" charset="0"/>
               <a:cs typeface="Arial" panose="020B0604020202020204" pitchFamily="34" charset="0"/>

</xml_diff>

<commit_message>
Kurumsal yazilim mimarileri sunum duzeltmeleri
</commit_message>
<xml_diff>
--- a/presentations/EnterpriseSoftwareArchitectures.pptx
+++ b/presentations/EnterpriseSoftwareArchitectures.pptx
@@ -853,7 +853,7 @@
             <a:fld id="{B61BEF0D-F0BB-DE4B-95CE-6DB70DBA9567}" type="datetimeFigureOut">
               <a:rPr lang="en-US" dirty="0"/>
               <a:pPr/>
-              <a:t>12/25/2023</a:t>
+              <a:t>12/31/2023</a:t>
             </a:fld>
             <a:endParaRPr lang="en-US" dirty="0"/>
           </a:p>
@@ -1101,7 +1101,7 @@
             <a:fld id="{B61BEF0D-F0BB-DE4B-95CE-6DB70DBA9567}" type="datetimeFigureOut">
               <a:rPr lang="en-US" dirty="0"/>
               <a:pPr/>
-              <a:t>12/25/2023</a:t>
+              <a:t>12/31/2023</a:t>
             </a:fld>
             <a:endParaRPr lang="en-US" dirty="0"/>
           </a:p>
@@ -1412,7 +1412,7 @@
             <a:fld id="{B61BEF0D-F0BB-DE4B-95CE-6DB70DBA9567}" type="datetimeFigureOut">
               <a:rPr lang="en-US" dirty="0"/>
               <a:pPr/>
-              <a:t>12/25/2023</a:t>
+              <a:t>12/31/2023</a:t>
             </a:fld>
             <a:endParaRPr lang="en-US" dirty="0"/>
           </a:p>
@@ -1750,7 +1750,7 @@
             <a:fld id="{B61BEF0D-F0BB-DE4B-95CE-6DB70DBA9567}" type="datetimeFigureOut">
               <a:rPr lang="en-US" dirty="0"/>
               <a:pPr/>
-              <a:t>12/25/2023</a:t>
+              <a:t>12/31/2023</a:t>
             </a:fld>
             <a:endParaRPr lang="en-US" dirty="0"/>
           </a:p>
@@ -2061,7 +2061,7 @@
             <a:fld id="{B61BEF0D-F0BB-DE4B-95CE-6DB70DBA9567}" type="datetimeFigureOut">
               <a:rPr lang="en-US" dirty="0"/>
               <a:pPr/>
-              <a:t>12/25/2023</a:t>
+              <a:t>12/31/2023</a:t>
             </a:fld>
             <a:endParaRPr lang="en-US" dirty="0"/>
           </a:p>
@@ -2451,7 +2451,7 @@
             <a:fld id="{B61BEF0D-F0BB-DE4B-95CE-6DB70DBA9567}" type="datetimeFigureOut">
               <a:rPr lang="en-US" dirty="0"/>
               <a:pPr/>
-              <a:t>12/25/2023</a:t>
+              <a:t>12/31/2023</a:t>
             </a:fld>
             <a:endParaRPr lang="en-US" dirty="0"/>
           </a:p>
@@ -2617,7 +2617,7 @@
           <a:p>
             <a:fld id="{55C6B4A9-1611-4792-9094-5F34BCA07E0B}" type="datetimeFigureOut">
               <a:rPr lang="en-US" dirty="0"/>
-              <a:t>12/25/2023</a:t>
+              <a:t>12/31/2023</a:t>
             </a:fld>
             <a:endParaRPr lang="en-US" dirty="0"/>
           </a:p>
@@ -2793,7 +2793,7 @@
             <a:fld id="{B61BEF0D-F0BB-DE4B-95CE-6DB70DBA9567}" type="datetimeFigureOut">
               <a:rPr lang="en-US" dirty="0"/>
               <a:pPr/>
-              <a:t>12/25/2023</a:t>
+              <a:t>12/31/2023</a:t>
             </a:fld>
             <a:endParaRPr lang="en-US" dirty="0"/>
           </a:p>
@@ -2966,7 +2966,7 @@
             <a:fld id="{B61BEF0D-F0BB-DE4B-95CE-6DB70DBA9567}" type="datetimeFigureOut">
               <a:rPr lang="en-US" dirty="0"/>
               <a:pPr/>
-              <a:t>12/25/2023</a:t>
+              <a:t>12/31/2023</a:t>
             </a:fld>
             <a:endParaRPr lang="en-US" dirty="0"/>
           </a:p>
@@ -3210,7 +3210,7 @@
             <a:fld id="{B61BEF0D-F0BB-DE4B-95CE-6DB70DBA9567}" type="datetimeFigureOut">
               <a:rPr lang="en-US" dirty="0"/>
               <a:pPr/>
-              <a:t>12/25/2023</a:t>
+              <a:t>12/31/2023</a:t>
             </a:fld>
             <a:endParaRPr lang="en-US" dirty="0"/>
           </a:p>
@@ -3438,7 +3438,7 @@
           <a:p>
             <a:fld id="{EB712588-04B1-427B-82EE-E8DB90309F08}" type="datetimeFigureOut">
               <a:rPr lang="en-US" dirty="0"/>
-              <a:t>12/25/2023</a:t>
+              <a:t>12/31/2023</a:t>
             </a:fld>
             <a:endParaRPr lang="en-US" dirty="0"/>
           </a:p>
@@ -3808,7 +3808,7 @@
             <a:fld id="{B61BEF0D-F0BB-DE4B-95CE-6DB70DBA9567}" type="datetimeFigureOut">
               <a:rPr lang="en-US" dirty="0"/>
               <a:pPr/>
-              <a:t>12/25/2023</a:t>
+              <a:t>12/31/2023</a:t>
             </a:fld>
             <a:endParaRPr lang="en-US" dirty="0"/>
           </a:p>
@@ -3928,7 +3928,7 @@
             <a:fld id="{B61BEF0D-F0BB-DE4B-95CE-6DB70DBA9567}" type="datetimeFigureOut">
               <a:rPr lang="en-US" dirty="0"/>
               <a:pPr/>
-              <a:t>12/25/2023</a:t>
+              <a:t>12/31/2023</a:t>
             </a:fld>
             <a:endParaRPr lang="en-US" dirty="0"/>
           </a:p>
@@ -4020,7 +4020,7 @@
             <a:fld id="{B61BEF0D-F0BB-DE4B-95CE-6DB70DBA9567}" type="datetimeFigureOut">
               <a:rPr lang="en-US" dirty="0"/>
               <a:pPr/>
-              <a:t>12/25/2023</a:t>
+              <a:t>12/31/2023</a:t>
             </a:fld>
             <a:endParaRPr lang="en-US" dirty="0"/>
           </a:p>
@@ -4271,7 +4271,7 @@
           <a:p>
             <a:fld id="{42A54C80-263E-416B-A8E0-580EDEADCBDC}" type="datetimeFigureOut">
               <a:rPr lang="en-US" dirty="0"/>
-              <a:t>12/25/2023</a:t>
+              <a:t>12/31/2023</a:t>
             </a:fld>
             <a:endParaRPr lang="en-US" dirty="0"/>
           </a:p>
@@ -4530,7 +4530,7 @@
             <a:fld id="{B61BEF0D-F0BB-DE4B-95CE-6DB70DBA9567}" type="datetimeFigureOut">
               <a:rPr lang="en-US" dirty="0"/>
               <a:pPr/>
-              <a:t>12/25/2023</a:t>
+              <a:t>12/31/2023</a:t>
             </a:fld>
             <a:endParaRPr lang="en-US" dirty="0"/>
           </a:p>
@@ -5270,7 +5270,7 @@
             <a:fld id="{B61BEF0D-F0BB-DE4B-95CE-6DB70DBA9567}" type="datetimeFigureOut">
               <a:rPr lang="en-US" dirty="0"/>
               <a:pPr/>
-              <a:t>12/25/2023</a:t>
+              <a:t>12/31/2023</a:t>
             </a:fld>
             <a:endParaRPr lang="en-US" dirty="0"/>
           </a:p>
@@ -12064,7 +12064,7 @@
         <p:spPr>
           <a:xfrm>
             <a:off x="3827237" y="866090"/>
-            <a:ext cx="5877886" cy="5509200"/>
+            <a:ext cx="5877886" cy="5755422"/>
           </a:xfrm>
           <a:prstGeom prst="rect">
             <a:avLst/>
@@ -12088,7 +12088,7 @@
                 <a:latin typeface="Arial" panose="020B0604020202020204" pitchFamily="34" charset="0"/>
                 <a:cs typeface="Arial" panose="020B0604020202020204" pitchFamily="34" charset="0"/>
               </a:rPr>
-              <a:t>Presentation </a:t>
+              <a:t> Presentation </a:t>
             </a:r>
             <a:r>
               <a:rPr lang="tr-TR" sz="1600" b="1" dirty="0" err="1">
@@ -12144,7 +12144,7 @@
                 <a:latin typeface="Arial" panose="020B0604020202020204" pitchFamily="34" charset="0"/>
                 <a:cs typeface="Arial" panose="020B0604020202020204" pitchFamily="34" charset="0"/>
               </a:rPr>
-              <a:t>Business </a:t>
+              <a:t> Business </a:t>
             </a:r>
             <a:r>
               <a:rPr lang="tr-TR" sz="1600" b="1" dirty="0" err="1">
@@ -12237,10 +12237,6 @@
             </a:r>
           </a:p>
           <a:p>
-            <a:pPr>
-              <a:buFont typeface="+mj-lt"/>
-              <a:buAutoNum type="arabicPeriod"/>
-            </a:pPr>
             <a:r>
               <a:rPr lang="tr-TR" sz="1600" b="1" dirty="0">
                 <a:solidFill>
@@ -12249,7 +12245,7 @@
                 <a:latin typeface="Arial" panose="020B0604020202020204" pitchFamily="34" charset="0"/>
                 <a:cs typeface="Arial" panose="020B0604020202020204" pitchFamily="34" charset="0"/>
               </a:rPr>
-              <a:t>Data Access </a:t>
+              <a:t>3. Data Access </a:t>
             </a:r>
             <a:r>
               <a:rPr lang="tr-TR" sz="1600" b="1" dirty="0" err="1">
@@ -13030,7 +13026,7 @@
                 <a:latin typeface="Arial" panose="020B0604020202020204" pitchFamily="34" charset="0"/>
                 <a:cs typeface="Arial" panose="020B0604020202020204" pitchFamily="34" charset="0"/>
               </a:rPr>
-              <a:t> temel yapı taşlarıdır. Bunlar özel olabilir (yalnızca bir kuruluşun dahili kullanıcıları tarafından kullanılabilir) veya genel olarak internet üzerinden herkes tarafından erişilebilir olabilir. Her hizmetin ayrı ayrı üç ana özelliği vardır.</a:t>
+              <a:t> temel yapı taşlarıdır. Bunlar özel olabilir (yalnızca bir kuruluşun dahili kullanıcıları tarafından kullanılabilir) veya genel olarak internet üzerinden herkes tarafından erişilebilir olabilir. Her service in ise ayrı ayrı üç ana özelliği vardır.</a:t>
             </a:r>
           </a:p>
           <a:p>
@@ -13205,7 +13201,7 @@
                 <a:latin typeface="Arial" panose="020B0604020202020204" pitchFamily="34" charset="0"/>
                 <a:cs typeface="Arial" panose="020B0604020202020204" pitchFamily="34" charset="0"/>
               </a:rPr>
-              <a:t>Hizmet sağlayıcı, başkalarının kullanabileceği bir veya daha fazla hizmeti oluşturur, sürdürür ve sağlar. Kuruluşlar kendi hizmetlerini oluşturabilir veya bunları üçüncü taraf hizmet satıcılarından satın alabilir.</a:t>
+              <a:t>Servis sağlayıcı, başkalarının kullanabileceği bir veya daha fazla servisi oluşturur, sürdürür ve sağlar. Kuruluşlar kendi servislerini oluşturabilir veya bunları üçüncü taraf servis satıcılarından satın alabilir.</a:t>
             </a:r>
           </a:p>
         </p:txBody>
@@ -13391,7 +13387,7 @@
                 <a:latin typeface="Arial" panose="020B0604020202020204" pitchFamily="34" charset="0"/>
                 <a:cs typeface="Arial" panose="020B0604020202020204" pitchFamily="34" charset="0"/>
               </a:rPr>
-              <a:t>Hizmet tüketicisi, hizmet sağlayıcıdan belirli bir hizmeti çalıştırmasını talep eder. Bütün bir sistem, uygulama veya başka bir hizmet olabilir. Hizmet sözleşmesi, hizmet sağlayıcı ile tüketicinin birbirleriyle etkileşimde bulunurken uymaları gereken kuralları belirtir. Hizmet sağlayıcılar ve tüketiciler farklı departmanlara, kuruluşlara ve hatta endüstrilere ait olabilir.</a:t>
+              <a:t>Servis tüketicisi, servis sağlayıcıdan belirli bir servisi çalıştırmasını talep eder. Bütün bir sistem, uygulama veya başka bir servis olabilir. Servis sözleşmesi, servis sağlayıcı ile tüketicinin birbirleriyle etkileşimde bulunurken uymaları gereken kuralları belirtir. Servis sağlayıcılar ve servis tüketiciler farklı departmanlara, kuruluşlara ve hatta endüstrilere ait olabilir.</a:t>
             </a:r>
           </a:p>
           <a:p>
@@ -13410,7 +13406,7 @@
                 <a:latin typeface="Arial" panose="020B0604020202020204" pitchFamily="34" charset="0"/>
                 <a:cs typeface="Arial" panose="020B0604020202020204" pitchFamily="34" charset="0"/>
               </a:rPr>
-              <a:t>Hizmet kaydı veya hizmet deposu, kullanılabilir hizmetlerin ağ üzerinden erişilebilen bir dizinidir. Servis sağlayıcılardan gelen servis açıklama dokümanlarını saklar. Açıklama belgeleri, hizmet ve hizmetle nasıl iletişim kurulacağı hakkında bilgiler içerir. Hizmet tüketicileri, hizmet kayıt defterini kullanarak ihtiyaç duydukları hizmetleri kolaylıkla keşfedebilirler.</a:t>
+              <a:t>Servis kaydı veya servis deposu, kullanılabilir servislerin ağ üzerinden erişilebilen bir dizinidir. Servis sağlayıcılardan gelen servis açıklama dokümanlarını saklar. Açıklama belgeleri, servis ve servis ile nasıl iletişim kurulacağı hakkında bilgiler içerir. Servis tüketicileri, servis kayıt defterini kullanarak ihtiyaç duydukları servisleri kolaylıkla keşfedebilirler.</a:t>
             </a:r>
             <a:endParaRPr lang="en-US" b="1" dirty="0">
               <a:latin typeface="Arial" panose="020B0604020202020204" pitchFamily="34" charset="0"/>
@@ -13798,7 +13794,7 @@
                 <a:latin typeface="Arial" panose="020B0604020202020204" pitchFamily="34" charset="0"/>
                 <a:cs typeface="Arial" panose="020B0604020202020204" pitchFamily="34" charset="0"/>
               </a:rPr>
-              <a:t>Kurumsal hizmet veri yolu (E</a:t>
+              <a:t>Kurumsal servis veri yolu (E</a:t>
             </a:r>
             <a:r>
               <a:rPr lang="en-US" b="1" dirty="0" err="1">
@@ -13861,7 +13857,7 @@
                 <a:latin typeface="Arial" panose="020B0604020202020204" pitchFamily="34" charset="0"/>
                 <a:cs typeface="Arial" panose="020B0604020202020204" pitchFamily="34" charset="0"/>
               </a:rPr>
-              <a:t>birden fazla hizmeti olan bir sistemle iletişim kurarken kullanabileceğiniz bir </a:t>
+              <a:t>birden fazla servisi olan bir sistemle iletişim kurarken kullanabileceğiniz bir </a:t>
             </a:r>
             <a:r>
               <a:rPr lang="en-US" dirty="0">
@@ -13903,7 +13899,7 @@
                 <a:latin typeface="Arial" panose="020B0604020202020204" pitchFamily="34" charset="0"/>
                 <a:cs typeface="Arial" panose="020B0604020202020204" pitchFamily="34" charset="0"/>
               </a:rPr>
-              <a:t>. Teknoloji ne olursa olsun, hizmetler ile hizmet tüketicileri arasındaki iletişimi kurar. ESB, yeniden kullanılabilir bir hizmet </a:t>
+              <a:t>. Teknoloji ne olursa olsun, servisler ile servis tüketicileri arasındaki iletişimi kurar. ESB, yeniden kullanılabilir bir servis </a:t>
             </a:r>
             <a:r>
               <a:rPr lang="tr-TR" dirty="0" err="1">

</xml_diff>